<commit_message>
1ere version du rapport sah
</commit_message>
<xml_diff>
--- a/schéma in silico.pptx
+++ b/schéma in silico.pptx
@@ -2,13 +2,14 @@
 <file path=ppt/presentation.xml><?xml version="1.0" encoding="utf-8"?>
 <p:presentation xmlns:a="http://schemas.openxmlformats.org/drawingml/2006/main" xmlns:r="http://schemas.openxmlformats.org/officeDocument/2006/relationships" xmlns:p="http://schemas.openxmlformats.org/presentationml/2006/main" saveSubsetFonts="1">
   <p:sldMasterIdLst>
-    <p:sldMasterId id="2147483660" r:id="rId1"/>
+    <p:sldMasterId id="2147483672" r:id="rId1"/>
   </p:sldMasterIdLst>
   <p:sldIdLst>
     <p:sldId id="256" r:id="rId2"/>
     <p:sldId id="257" r:id="rId3"/>
+    <p:sldId id="258" r:id="rId4"/>
   </p:sldIdLst>
-  <p:sldSz cx="12192000" cy="12192000"/>
+  <p:sldSz cx="16200438" cy="12192000"/>
   <p:notesSz cx="6858000" cy="9144000"/>
   <p:defaultTextStyle>
     <a:defPPr>
@@ -105,6 +106,11 @@
       </a:defRPr>
     </a:lvl9pPr>
   </p:defaultTextStyle>
+  <p:extLst>
+    <p:ext uri="{EFAFB233-063F-42B5-8137-9DF3F51BA10A}">
+      <p15:sldGuideLst xmlns:p15="http://schemas.microsoft.com/office/powerpoint/2012/main"/>
+    </p:ext>
+  </p:extLst>
 </p:presentation>
 </file>
 
@@ -137,15 +143,15 @@
         </p:nvSpPr>
         <p:spPr>
           <a:xfrm>
-            <a:off x="914400" y="1995312"/>
-            <a:ext cx="10363200" cy="4244622"/>
+            <a:off x="1215033" y="1995312"/>
+            <a:ext cx="13770372" cy="4244622"/>
           </a:xfrm>
         </p:spPr>
         <p:txBody>
           <a:bodyPr anchor="b"/>
           <a:lstStyle>
             <a:lvl1pPr algn="ctr">
-              <a:defRPr sz="8000"/>
+              <a:defRPr sz="10630"/>
             </a:lvl1pPr>
           </a:lstStyle>
           <a:p>
@@ -169,8 +175,8 @@
         </p:nvSpPr>
         <p:spPr>
           <a:xfrm>
-            <a:off x="1524000" y="6403623"/>
-            <a:ext cx="9144000" cy="2943577"/>
+            <a:off x="2025055" y="6403623"/>
+            <a:ext cx="12150329" cy="2943577"/>
           </a:xfrm>
         </p:spPr>
         <p:txBody>
@@ -178,39 +184,39 @@
           <a:lstStyle>
             <a:lvl1pPr marL="0" indent="0" algn="ctr">
               <a:buNone/>
-              <a:defRPr sz="3200"/>
+              <a:defRPr sz="4252"/>
             </a:lvl1pPr>
-            <a:lvl2pPr marL="609585" indent="0" algn="ctr">
+            <a:lvl2pPr marL="810021" indent="0" algn="ctr">
               <a:buNone/>
-              <a:defRPr sz="2667"/>
+              <a:defRPr sz="3543"/>
             </a:lvl2pPr>
-            <a:lvl3pPr marL="1219170" indent="0" algn="ctr">
+            <a:lvl3pPr marL="1620042" indent="0" algn="ctr">
               <a:buNone/>
-              <a:defRPr sz="2400"/>
+              <a:defRPr sz="3189"/>
             </a:lvl3pPr>
-            <a:lvl4pPr marL="1828754" indent="0" algn="ctr">
+            <a:lvl4pPr marL="2430064" indent="0" algn="ctr">
               <a:buNone/>
-              <a:defRPr sz="2133"/>
+              <a:defRPr sz="2835"/>
             </a:lvl4pPr>
-            <a:lvl5pPr marL="2438339" indent="0" algn="ctr">
+            <a:lvl5pPr marL="3240085" indent="0" algn="ctr">
               <a:buNone/>
-              <a:defRPr sz="2133"/>
+              <a:defRPr sz="2835"/>
             </a:lvl5pPr>
-            <a:lvl6pPr marL="3047924" indent="0" algn="ctr">
+            <a:lvl6pPr marL="4050106" indent="0" algn="ctr">
               <a:buNone/>
-              <a:defRPr sz="2133"/>
+              <a:defRPr sz="2835"/>
             </a:lvl6pPr>
-            <a:lvl7pPr marL="3657509" indent="0" algn="ctr">
+            <a:lvl7pPr marL="4860127" indent="0" algn="ctr">
               <a:buNone/>
-              <a:defRPr sz="2133"/>
+              <a:defRPr sz="2835"/>
             </a:lvl7pPr>
-            <a:lvl8pPr marL="4267093" indent="0" algn="ctr">
+            <a:lvl8pPr marL="5670149" indent="0" algn="ctr">
               <a:buNone/>
-              <a:defRPr sz="2133"/>
+              <a:defRPr sz="2835"/>
             </a:lvl8pPr>
-            <a:lvl9pPr marL="4876678" indent="0" algn="ctr">
+            <a:lvl9pPr marL="6480170" indent="0" algn="ctr">
               <a:buNone/>
-              <a:defRPr sz="2133"/>
+              <a:defRPr sz="2835"/>
             </a:lvl9pPr>
           </a:lstStyle>
           <a:p>
@@ -239,7 +245,7 @@
           <a:p>
             <a:fld id="{CC2592F0-55DC-4691-9AD5-C3E112871D93}" type="datetimeFigureOut">
               <a:rPr lang="fr-FR" smtClean="0"/>
-              <a:t>11/08/2023</a:t>
+              <a:t>23/08/2023</a:t>
             </a:fld>
             <a:endParaRPr lang="fr-FR"/>
           </a:p>
@@ -290,7 +296,7 @@
     </p:spTree>
     <p:extLst>
       <p:ext uri="{BB962C8B-B14F-4D97-AF65-F5344CB8AC3E}">
-        <p14:creationId xmlns:p14="http://schemas.microsoft.com/office/powerpoint/2010/main" val="2441841890"/>
+        <p14:creationId xmlns:p14="http://schemas.microsoft.com/office/powerpoint/2010/main" val="602135548"/>
       </p:ext>
     </p:extLst>
   </p:cSld>
@@ -409,7 +415,7 @@
           <a:p>
             <a:fld id="{CC2592F0-55DC-4691-9AD5-C3E112871D93}" type="datetimeFigureOut">
               <a:rPr lang="fr-FR" smtClean="0"/>
-              <a:t>11/08/2023</a:t>
+              <a:t>23/08/2023</a:t>
             </a:fld>
             <a:endParaRPr lang="fr-FR"/>
           </a:p>
@@ -460,7 +466,7 @@
     </p:spTree>
     <p:extLst>
       <p:ext uri="{BB962C8B-B14F-4D97-AF65-F5344CB8AC3E}">
-        <p14:creationId xmlns:p14="http://schemas.microsoft.com/office/powerpoint/2010/main" val="3395734104"/>
+        <p14:creationId xmlns:p14="http://schemas.microsoft.com/office/powerpoint/2010/main" val="2665138778"/>
       </p:ext>
     </p:extLst>
   </p:cSld>
@@ -499,8 +505,8 @@
         </p:nvSpPr>
         <p:spPr>
           <a:xfrm>
-            <a:off x="8724901" y="649111"/>
-            <a:ext cx="2628900" cy="10332156"/>
+            <a:off x="11593440" y="649111"/>
+            <a:ext cx="3493219" cy="10332156"/>
           </a:xfrm>
         </p:spPr>
         <p:txBody>
@@ -527,8 +533,8 @@
         </p:nvSpPr>
         <p:spPr>
           <a:xfrm>
-            <a:off x="838201" y="649111"/>
-            <a:ext cx="7734300" cy="10332156"/>
+            <a:off x="1113781" y="649111"/>
+            <a:ext cx="10277153" cy="10332156"/>
           </a:xfrm>
         </p:spPr>
         <p:txBody>
@@ -589,7 +595,7 @@
           <a:p>
             <a:fld id="{CC2592F0-55DC-4691-9AD5-C3E112871D93}" type="datetimeFigureOut">
               <a:rPr lang="fr-FR" smtClean="0"/>
-              <a:t>11/08/2023</a:t>
+              <a:t>23/08/2023</a:t>
             </a:fld>
             <a:endParaRPr lang="fr-FR"/>
           </a:p>
@@ -640,7 +646,7 @@
     </p:spTree>
     <p:extLst>
       <p:ext uri="{BB962C8B-B14F-4D97-AF65-F5344CB8AC3E}">
-        <p14:creationId xmlns:p14="http://schemas.microsoft.com/office/powerpoint/2010/main" val="3155547723"/>
+        <p14:creationId xmlns:p14="http://schemas.microsoft.com/office/powerpoint/2010/main" val="1581020493"/>
       </p:ext>
     </p:extLst>
   </p:cSld>
@@ -759,7 +765,7 @@
           <a:p>
             <a:fld id="{CC2592F0-55DC-4691-9AD5-C3E112871D93}" type="datetimeFigureOut">
               <a:rPr lang="fr-FR" smtClean="0"/>
-              <a:t>11/08/2023</a:t>
+              <a:t>23/08/2023</a:t>
             </a:fld>
             <a:endParaRPr lang="fr-FR"/>
           </a:p>
@@ -810,7 +816,7 @@
     </p:spTree>
     <p:extLst>
       <p:ext uri="{BB962C8B-B14F-4D97-AF65-F5344CB8AC3E}">
-        <p14:creationId xmlns:p14="http://schemas.microsoft.com/office/powerpoint/2010/main" val="880562065"/>
+        <p14:creationId xmlns:p14="http://schemas.microsoft.com/office/powerpoint/2010/main" val="3887934589"/>
       </p:ext>
     </p:extLst>
   </p:cSld>
@@ -849,15 +855,15 @@
         </p:nvSpPr>
         <p:spPr>
           <a:xfrm>
-            <a:off x="831851" y="3039537"/>
-            <a:ext cx="10515600" cy="5071532"/>
+            <a:off x="1105343" y="3039537"/>
+            <a:ext cx="13972878" cy="5071532"/>
           </a:xfrm>
         </p:spPr>
         <p:txBody>
           <a:bodyPr anchor="b"/>
           <a:lstStyle>
             <a:lvl1pPr>
-              <a:defRPr sz="8000"/>
+              <a:defRPr sz="10630"/>
             </a:lvl1pPr>
           </a:lstStyle>
           <a:p>
@@ -881,8 +887,8 @@
         </p:nvSpPr>
         <p:spPr>
           <a:xfrm>
-            <a:off x="831851" y="8159048"/>
-            <a:ext cx="10515600" cy="2666999"/>
+            <a:off x="1105343" y="8159048"/>
+            <a:ext cx="13972878" cy="2666999"/>
           </a:xfrm>
         </p:spPr>
         <p:txBody>
@@ -890,15 +896,15 @@
           <a:lstStyle>
             <a:lvl1pPr marL="0" indent="0">
               <a:buNone/>
-              <a:defRPr sz="3200">
+              <a:defRPr sz="4252">
                 <a:solidFill>
                   <a:schemeClr val="tx1"/>
                 </a:solidFill>
               </a:defRPr>
             </a:lvl1pPr>
-            <a:lvl2pPr marL="609585" indent="0">
+            <a:lvl2pPr marL="810021" indent="0">
               <a:buNone/>
-              <a:defRPr sz="2667">
+              <a:defRPr sz="3543">
                 <a:solidFill>
                   <a:schemeClr val="tx1">
                     <a:tint val="75000"/>
@@ -906,9 +912,9 @@
                 </a:solidFill>
               </a:defRPr>
             </a:lvl2pPr>
-            <a:lvl3pPr marL="1219170" indent="0">
+            <a:lvl3pPr marL="1620042" indent="0">
               <a:buNone/>
-              <a:defRPr sz="2400">
+              <a:defRPr sz="3189">
                 <a:solidFill>
                   <a:schemeClr val="tx1">
                     <a:tint val="75000"/>
@@ -916,9 +922,9 @@
                 </a:solidFill>
               </a:defRPr>
             </a:lvl3pPr>
-            <a:lvl4pPr marL="1828754" indent="0">
+            <a:lvl4pPr marL="2430064" indent="0">
               <a:buNone/>
-              <a:defRPr sz="2133">
+              <a:defRPr sz="2835">
                 <a:solidFill>
                   <a:schemeClr val="tx1">
                     <a:tint val="75000"/>
@@ -926,9 +932,9 @@
                 </a:solidFill>
               </a:defRPr>
             </a:lvl4pPr>
-            <a:lvl5pPr marL="2438339" indent="0">
+            <a:lvl5pPr marL="3240085" indent="0">
               <a:buNone/>
-              <a:defRPr sz="2133">
+              <a:defRPr sz="2835">
                 <a:solidFill>
                   <a:schemeClr val="tx1">
                     <a:tint val="75000"/>
@@ -936,9 +942,9 @@
                 </a:solidFill>
               </a:defRPr>
             </a:lvl5pPr>
-            <a:lvl6pPr marL="3047924" indent="0">
+            <a:lvl6pPr marL="4050106" indent="0">
               <a:buNone/>
-              <a:defRPr sz="2133">
+              <a:defRPr sz="2835">
                 <a:solidFill>
                   <a:schemeClr val="tx1">
                     <a:tint val="75000"/>
@@ -946,9 +952,9 @@
                 </a:solidFill>
               </a:defRPr>
             </a:lvl6pPr>
-            <a:lvl7pPr marL="3657509" indent="0">
+            <a:lvl7pPr marL="4860127" indent="0">
               <a:buNone/>
-              <a:defRPr sz="2133">
+              <a:defRPr sz="2835">
                 <a:solidFill>
                   <a:schemeClr val="tx1">
                     <a:tint val="75000"/>
@@ -956,9 +962,9 @@
                 </a:solidFill>
               </a:defRPr>
             </a:lvl7pPr>
-            <a:lvl8pPr marL="4267093" indent="0">
+            <a:lvl8pPr marL="5670149" indent="0">
               <a:buNone/>
-              <a:defRPr sz="2133">
+              <a:defRPr sz="2835">
                 <a:solidFill>
                   <a:schemeClr val="tx1">
                     <a:tint val="75000"/>
@@ -966,9 +972,9 @@
                 </a:solidFill>
               </a:defRPr>
             </a:lvl8pPr>
-            <a:lvl9pPr marL="4876678" indent="0">
+            <a:lvl9pPr marL="6480170" indent="0">
               <a:buNone/>
-              <a:defRPr sz="2133">
+              <a:defRPr sz="2835">
                 <a:solidFill>
                   <a:schemeClr val="tx1">
                     <a:tint val="75000"/>
@@ -1003,7 +1009,7 @@
           <a:p>
             <a:fld id="{CC2592F0-55DC-4691-9AD5-C3E112871D93}" type="datetimeFigureOut">
               <a:rPr lang="fr-FR" smtClean="0"/>
-              <a:t>11/08/2023</a:t>
+              <a:t>23/08/2023</a:t>
             </a:fld>
             <a:endParaRPr lang="fr-FR"/>
           </a:p>
@@ -1054,7 +1060,7 @@
     </p:spTree>
     <p:extLst>
       <p:ext uri="{BB962C8B-B14F-4D97-AF65-F5344CB8AC3E}">
-        <p14:creationId xmlns:p14="http://schemas.microsoft.com/office/powerpoint/2010/main" val="1961446076"/>
+        <p14:creationId xmlns:p14="http://schemas.microsoft.com/office/powerpoint/2010/main" val="1438715512"/>
       </p:ext>
     </p:extLst>
   </p:cSld>
@@ -1116,8 +1122,8 @@
         </p:nvSpPr>
         <p:spPr>
           <a:xfrm>
-            <a:off x="838200" y="3245556"/>
-            <a:ext cx="5181600" cy="7735712"/>
+            <a:off x="1113780" y="3245556"/>
+            <a:ext cx="6885186" cy="7735712"/>
           </a:xfrm>
         </p:spPr>
         <p:txBody>
@@ -1173,8 +1179,8 @@
         </p:nvSpPr>
         <p:spPr>
           <a:xfrm>
-            <a:off x="6172200" y="3245556"/>
-            <a:ext cx="5181600" cy="7735712"/>
+            <a:off x="8201472" y="3245556"/>
+            <a:ext cx="6885186" cy="7735712"/>
           </a:xfrm>
         </p:spPr>
         <p:txBody>
@@ -1235,7 +1241,7 @@
           <a:p>
             <a:fld id="{CC2592F0-55DC-4691-9AD5-C3E112871D93}" type="datetimeFigureOut">
               <a:rPr lang="fr-FR" smtClean="0"/>
-              <a:t>11/08/2023</a:t>
+              <a:t>23/08/2023</a:t>
             </a:fld>
             <a:endParaRPr lang="fr-FR"/>
           </a:p>
@@ -1286,7 +1292,7 @@
     </p:spTree>
     <p:extLst>
       <p:ext uri="{BB962C8B-B14F-4D97-AF65-F5344CB8AC3E}">
-        <p14:creationId xmlns:p14="http://schemas.microsoft.com/office/powerpoint/2010/main" val="3725278742"/>
+        <p14:creationId xmlns:p14="http://schemas.microsoft.com/office/powerpoint/2010/main" val="2635414172"/>
       </p:ext>
     </p:extLst>
   </p:cSld>
@@ -1325,8 +1331,8 @@
         </p:nvSpPr>
         <p:spPr>
           <a:xfrm>
-            <a:off x="839788" y="649114"/>
-            <a:ext cx="10515600" cy="2356556"/>
+            <a:off x="1115890" y="649114"/>
+            <a:ext cx="13972878" cy="2356556"/>
           </a:xfrm>
         </p:spPr>
         <p:txBody>
@@ -1353,8 +1359,8 @@
         </p:nvSpPr>
         <p:spPr>
           <a:xfrm>
-            <a:off x="839789" y="2988734"/>
-            <a:ext cx="5157787" cy="1464732"/>
+            <a:off x="1115892" y="2988734"/>
+            <a:ext cx="6853544" cy="1464732"/>
           </a:xfrm>
         </p:spPr>
         <p:txBody>
@@ -1362,39 +1368,39 @@
           <a:lstStyle>
             <a:lvl1pPr marL="0" indent="0">
               <a:buNone/>
-              <a:defRPr sz="3200" b="1"/>
+              <a:defRPr sz="4252" b="1"/>
             </a:lvl1pPr>
-            <a:lvl2pPr marL="609585" indent="0">
+            <a:lvl2pPr marL="810021" indent="0">
               <a:buNone/>
-              <a:defRPr sz="2667" b="1"/>
+              <a:defRPr sz="3543" b="1"/>
             </a:lvl2pPr>
-            <a:lvl3pPr marL="1219170" indent="0">
+            <a:lvl3pPr marL="1620042" indent="0">
               <a:buNone/>
-              <a:defRPr sz="2400" b="1"/>
+              <a:defRPr sz="3189" b="1"/>
             </a:lvl3pPr>
-            <a:lvl4pPr marL="1828754" indent="0">
+            <a:lvl4pPr marL="2430064" indent="0">
               <a:buNone/>
-              <a:defRPr sz="2133" b="1"/>
+              <a:defRPr sz="2835" b="1"/>
             </a:lvl4pPr>
-            <a:lvl5pPr marL="2438339" indent="0">
+            <a:lvl5pPr marL="3240085" indent="0">
               <a:buNone/>
-              <a:defRPr sz="2133" b="1"/>
+              <a:defRPr sz="2835" b="1"/>
             </a:lvl5pPr>
-            <a:lvl6pPr marL="3047924" indent="0">
+            <a:lvl6pPr marL="4050106" indent="0">
               <a:buNone/>
-              <a:defRPr sz="2133" b="1"/>
+              <a:defRPr sz="2835" b="1"/>
             </a:lvl6pPr>
-            <a:lvl7pPr marL="3657509" indent="0">
+            <a:lvl7pPr marL="4860127" indent="0">
               <a:buNone/>
-              <a:defRPr sz="2133" b="1"/>
+              <a:defRPr sz="2835" b="1"/>
             </a:lvl7pPr>
-            <a:lvl8pPr marL="4267093" indent="0">
+            <a:lvl8pPr marL="5670149" indent="0">
               <a:buNone/>
-              <a:defRPr sz="2133" b="1"/>
+              <a:defRPr sz="2835" b="1"/>
             </a:lvl8pPr>
-            <a:lvl9pPr marL="4876678" indent="0">
+            <a:lvl9pPr marL="6480170" indent="0">
               <a:buNone/>
-              <a:defRPr sz="2133" b="1"/>
+              <a:defRPr sz="2835" b="1"/>
             </a:lvl9pPr>
           </a:lstStyle>
           <a:p>
@@ -1418,8 +1424,8 @@
         </p:nvSpPr>
         <p:spPr>
           <a:xfrm>
-            <a:off x="839789" y="4453467"/>
-            <a:ext cx="5157787" cy="6550379"/>
+            <a:off x="1115892" y="4453467"/>
+            <a:ext cx="6853544" cy="6550379"/>
           </a:xfrm>
         </p:spPr>
         <p:txBody>
@@ -1475,8 +1481,8 @@
         </p:nvSpPr>
         <p:spPr>
           <a:xfrm>
-            <a:off x="6172201" y="2988734"/>
-            <a:ext cx="5183188" cy="1464732"/>
+            <a:off x="8201473" y="2988734"/>
+            <a:ext cx="6887296" cy="1464732"/>
           </a:xfrm>
         </p:spPr>
         <p:txBody>
@@ -1484,39 +1490,39 @@
           <a:lstStyle>
             <a:lvl1pPr marL="0" indent="0">
               <a:buNone/>
-              <a:defRPr sz="3200" b="1"/>
+              <a:defRPr sz="4252" b="1"/>
             </a:lvl1pPr>
-            <a:lvl2pPr marL="609585" indent="0">
+            <a:lvl2pPr marL="810021" indent="0">
               <a:buNone/>
-              <a:defRPr sz="2667" b="1"/>
+              <a:defRPr sz="3543" b="1"/>
             </a:lvl2pPr>
-            <a:lvl3pPr marL="1219170" indent="0">
+            <a:lvl3pPr marL="1620042" indent="0">
               <a:buNone/>
-              <a:defRPr sz="2400" b="1"/>
+              <a:defRPr sz="3189" b="1"/>
             </a:lvl3pPr>
-            <a:lvl4pPr marL="1828754" indent="0">
+            <a:lvl4pPr marL="2430064" indent="0">
               <a:buNone/>
-              <a:defRPr sz="2133" b="1"/>
+              <a:defRPr sz="2835" b="1"/>
             </a:lvl4pPr>
-            <a:lvl5pPr marL="2438339" indent="0">
+            <a:lvl5pPr marL="3240085" indent="0">
               <a:buNone/>
-              <a:defRPr sz="2133" b="1"/>
+              <a:defRPr sz="2835" b="1"/>
             </a:lvl5pPr>
-            <a:lvl6pPr marL="3047924" indent="0">
+            <a:lvl6pPr marL="4050106" indent="0">
               <a:buNone/>
-              <a:defRPr sz="2133" b="1"/>
+              <a:defRPr sz="2835" b="1"/>
             </a:lvl6pPr>
-            <a:lvl7pPr marL="3657509" indent="0">
+            <a:lvl7pPr marL="4860127" indent="0">
               <a:buNone/>
-              <a:defRPr sz="2133" b="1"/>
+              <a:defRPr sz="2835" b="1"/>
             </a:lvl7pPr>
-            <a:lvl8pPr marL="4267093" indent="0">
+            <a:lvl8pPr marL="5670149" indent="0">
               <a:buNone/>
-              <a:defRPr sz="2133" b="1"/>
+              <a:defRPr sz="2835" b="1"/>
             </a:lvl8pPr>
-            <a:lvl9pPr marL="4876678" indent="0">
+            <a:lvl9pPr marL="6480170" indent="0">
               <a:buNone/>
-              <a:defRPr sz="2133" b="1"/>
+              <a:defRPr sz="2835" b="1"/>
             </a:lvl9pPr>
           </a:lstStyle>
           <a:p>
@@ -1540,8 +1546,8 @@
         </p:nvSpPr>
         <p:spPr>
           <a:xfrm>
-            <a:off x="6172201" y="4453467"/>
-            <a:ext cx="5183188" cy="6550379"/>
+            <a:off x="8201473" y="4453467"/>
+            <a:ext cx="6887296" cy="6550379"/>
           </a:xfrm>
         </p:spPr>
         <p:txBody>
@@ -1602,7 +1608,7 @@
           <a:p>
             <a:fld id="{CC2592F0-55DC-4691-9AD5-C3E112871D93}" type="datetimeFigureOut">
               <a:rPr lang="fr-FR" smtClean="0"/>
-              <a:t>11/08/2023</a:t>
+              <a:t>23/08/2023</a:t>
             </a:fld>
             <a:endParaRPr lang="fr-FR"/>
           </a:p>
@@ -1653,7 +1659,7 @@
     </p:spTree>
     <p:extLst>
       <p:ext uri="{BB962C8B-B14F-4D97-AF65-F5344CB8AC3E}">
-        <p14:creationId xmlns:p14="http://schemas.microsoft.com/office/powerpoint/2010/main" val="3500844876"/>
+        <p14:creationId xmlns:p14="http://schemas.microsoft.com/office/powerpoint/2010/main" val="1737250421"/>
       </p:ext>
     </p:extLst>
   </p:cSld>
@@ -1720,7 +1726,7 @@
           <a:p>
             <a:fld id="{CC2592F0-55DC-4691-9AD5-C3E112871D93}" type="datetimeFigureOut">
               <a:rPr lang="fr-FR" smtClean="0"/>
-              <a:t>11/08/2023</a:t>
+              <a:t>23/08/2023</a:t>
             </a:fld>
             <a:endParaRPr lang="fr-FR"/>
           </a:p>
@@ -1771,7 +1777,7 @@
     </p:spTree>
     <p:extLst>
       <p:ext uri="{BB962C8B-B14F-4D97-AF65-F5344CB8AC3E}">
-        <p14:creationId xmlns:p14="http://schemas.microsoft.com/office/powerpoint/2010/main" val="1969323608"/>
+        <p14:creationId xmlns:p14="http://schemas.microsoft.com/office/powerpoint/2010/main" val="3738185114"/>
       </p:ext>
     </p:extLst>
   </p:cSld>
@@ -1815,7 +1821,7 @@
           <a:p>
             <a:fld id="{CC2592F0-55DC-4691-9AD5-C3E112871D93}" type="datetimeFigureOut">
               <a:rPr lang="fr-FR" smtClean="0"/>
-              <a:t>11/08/2023</a:t>
+              <a:t>23/08/2023</a:t>
             </a:fld>
             <a:endParaRPr lang="fr-FR"/>
           </a:p>
@@ -1866,7 +1872,7 @@
     </p:spTree>
     <p:extLst>
       <p:ext uri="{BB962C8B-B14F-4D97-AF65-F5344CB8AC3E}">
-        <p14:creationId xmlns:p14="http://schemas.microsoft.com/office/powerpoint/2010/main" val="1682703131"/>
+        <p14:creationId xmlns:p14="http://schemas.microsoft.com/office/powerpoint/2010/main" val="3017703093"/>
       </p:ext>
     </p:extLst>
   </p:cSld>
@@ -1905,15 +1911,15 @@
         </p:nvSpPr>
         <p:spPr>
           <a:xfrm>
-            <a:off x="839788" y="812800"/>
-            <a:ext cx="3932237" cy="2844800"/>
+            <a:off x="1115890" y="812800"/>
+            <a:ext cx="5225063" cy="2844800"/>
           </a:xfrm>
         </p:spPr>
         <p:txBody>
           <a:bodyPr anchor="b"/>
           <a:lstStyle>
             <a:lvl1pPr>
-              <a:defRPr sz="4267"/>
+              <a:defRPr sz="5669"/>
             </a:lvl1pPr>
           </a:lstStyle>
           <a:p>
@@ -1937,39 +1943,39 @@
         </p:nvSpPr>
         <p:spPr>
           <a:xfrm>
-            <a:off x="5183188" y="1755425"/>
-            <a:ext cx="6172200" cy="8664222"/>
+            <a:off x="6887296" y="1755425"/>
+            <a:ext cx="8201472" cy="8664222"/>
           </a:xfrm>
         </p:spPr>
         <p:txBody>
           <a:bodyPr/>
           <a:lstStyle>
             <a:lvl1pPr>
-              <a:defRPr sz="4267"/>
+              <a:defRPr sz="5669"/>
             </a:lvl1pPr>
             <a:lvl2pPr>
-              <a:defRPr sz="3733"/>
+              <a:defRPr sz="4961"/>
             </a:lvl2pPr>
             <a:lvl3pPr>
-              <a:defRPr sz="3200"/>
+              <a:defRPr sz="4252"/>
             </a:lvl3pPr>
             <a:lvl4pPr>
-              <a:defRPr sz="2667"/>
+              <a:defRPr sz="3543"/>
             </a:lvl4pPr>
             <a:lvl5pPr>
-              <a:defRPr sz="2667"/>
+              <a:defRPr sz="3543"/>
             </a:lvl5pPr>
             <a:lvl6pPr>
-              <a:defRPr sz="2667"/>
+              <a:defRPr sz="3543"/>
             </a:lvl6pPr>
             <a:lvl7pPr>
-              <a:defRPr sz="2667"/>
+              <a:defRPr sz="3543"/>
             </a:lvl7pPr>
             <a:lvl8pPr>
-              <a:defRPr sz="2667"/>
+              <a:defRPr sz="3543"/>
             </a:lvl8pPr>
             <a:lvl9pPr>
-              <a:defRPr sz="2667"/>
+              <a:defRPr sz="3543"/>
             </a:lvl9pPr>
           </a:lstStyle>
           <a:p>
@@ -2022,8 +2028,8 @@
         </p:nvSpPr>
         <p:spPr>
           <a:xfrm>
-            <a:off x="839788" y="3657600"/>
-            <a:ext cx="3932237" cy="6776156"/>
+            <a:off x="1115890" y="3657600"/>
+            <a:ext cx="5225063" cy="6776156"/>
           </a:xfrm>
         </p:spPr>
         <p:txBody>
@@ -2031,39 +2037,39 @@
           <a:lstStyle>
             <a:lvl1pPr marL="0" indent="0">
               <a:buNone/>
-              <a:defRPr sz="2133"/>
+              <a:defRPr sz="2835"/>
             </a:lvl1pPr>
-            <a:lvl2pPr marL="609585" indent="0">
+            <a:lvl2pPr marL="810021" indent="0">
               <a:buNone/>
-              <a:defRPr sz="1867"/>
+              <a:defRPr sz="2480"/>
             </a:lvl2pPr>
-            <a:lvl3pPr marL="1219170" indent="0">
+            <a:lvl3pPr marL="1620042" indent="0">
               <a:buNone/>
-              <a:defRPr sz="1600"/>
+              <a:defRPr sz="2126"/>
             </a:lvl3pPr>
-            <a:lvl4pPr marL="1828754" indent="0">
+            <a:lvl4pPr marL="2430064" indent="0">
               <a:buNone/>
-              <a:defRPr sz="1333"/>
+              <a:defRPr sz="1772"/>
             </a:lvl4pPr>
-            <a:lvl5pPr marL="2438339" indent="0">
+            <a:lvl5pPr marL="3240085" indent="0">
               <a:buNone/>
-              <a:defRPr sz="1333"/>
+              <a:defRPr sz="1772"/>
             </a:lvl5pPr>
-            <a:lvl6pPr marL="3047924" indent="0">
+            <a:lvl6pPr marL="4050106" indent="0">
               <a:buNone/>
-              <a:defRPr sz="1333"/>
+              <a:defRPr sz="1772"/>
             </a:lvl6pPr>
-            <a:lvl7pPr marL="3657509" indent="0">
+            <a:lvl7pPr marL="4860127" indent="0">
               <a:buNone/>
-              <a:defRPr sz="1333"/>
+              <a:defRPr sz="1772"/>
             </a:lvl7pPr>
-            <a:lvl8pPr marL="4267093" indent="0">
+            <a:lvl8pPr marL="5670149" indent="0">
               <a:buNone/>
-              <a:defRPr sz="1333"/>
+              <a:defRPr sz="1772"/>
             </a:lvl8pPr>
-            <a:lvl9pPr marL="4876678" indent="0">
+            <a:lvl9pPr marL="6480170" indent="0">
               <a:buNone/>
-              <a:defRPr sz="1333"/>
+              <a:defRPr sz="1772"/>
             </a:lvl9pPr>
           </a:lstStyle>
           <a:p>
@@ -2092,7 +2098,7 @@
           <a:p>
             <a:fld id="{CC2592F0-55DC-4691-9AD5-C3E112871D93}" type="datetimeFigureOut">
               <a:rPr lang="fr-FR" smtClean="0"/>
-              <a:t>11/08/2023</a:t>
+              <a:t>23/08/2023</a:t>
             </a:fld>
             <a:endParaRPr lang="fr-FR"/>
           </a:p>
@@ -2143,7 +2149,7 @@
     </p:spTree>
     <p:extLst>
       <p:ext uri="{BB962C8B-B14F-4D97-AF65-F5344CB8AC3E}">
-        <p14:creationId xmlns:p14="http://schemas.microsoft.com/office/powerpoint/2010/main" val="2979445066"/>
+        <p14:creationId xmlns:p14="http://schemas.microsoft.com/office/powerpoint/2010/main" val="1380424164"/>
       </p:ext>
     </p:extLst>
   </p:cSld>
@@ -2182,15 +2188,15 @@
         </p:nvSpPr>
         <p:spPr>
           <a:xfrm>
-            <a:off x="839788" y="812800"/>
-            <a:ext cx="3932237" cy="2844800"/>
+            <a:off x="1115890" y="812800"/>
+            <a:ext cx="5225063" cy="2844800"/>
           </a:xfrm>
         </p:spPr>
         <p:txBody>
           <a:bodyPr anchor="b"/>
           <a:lstStyle>
             <a:lvl1pPr>
-              <a:defRPr sz="4267"/>
+              <a:defRPr sz="5669"/>
             </a:lvl1pPr>
           </a:lstStyle>
           <a:p>
@@ -2214,8 +2220,8 @@
         </p:nvSpPr>
         <p:spPr>
           <a:xfrm>
-            <a:off x="5183188" y="1755425"/>
-            <a:ext cx="6172200" cy="8664222"/>
+            <a:off x="6887296" y="1755425"/>
+            <a:ext cx="8201472" cy="8664222"/>
           </a:xfrm>
         </p:spPr>
         <p:txBody>
@@ -2223,39 +2229,39 @@
           <a:lstStyle>
             <a:lvl1pPr marL="0" indent="0">
               <a:buNone/>
-              <a:defRPr sz="4267"/>
+              <a:defRPr sz="5669"/>
             </a:lvl1pPr>
-            <a:lvl2pPr marL="609585" indent="0">
+            <a:lvl2pPr marL="810021" indent="0">
               <a:buNone/>
-              <a:defRPr sz="3733"/>
+              <a:defRPr sz="4961"/>
             </a:lvl2pPr>
-            <a:lvl3pPr marL="1219170" indent="0">
+            <a:lvl3pPr marL="1620042" indent="0">
               <a:buNone/>
-              <a:defRPr sz="3200"/>
+              <a:defRPr sz="4252"/>
             </a:lvl3pPr>
-            <a:lvl4pPr marL="1828754" indent="0">
+            <a:lvl4pPr marL="2430064" indent="0">
               <a:buNone/>
-              <a:defRPr sz="2667"/>
+              <a:defRPr sz="3543"/>
             </a:lvl4pPr>
-            <a:lvl5pPr marL="2438339" indent="0">
+            <a:lvl5pPr marL="3240085" indent="0">
               <a:buNone/>
-              <a:defRPr sz="2667"/>
+              <a:defRPr sz="3543"/>
             </a:lvl5pPr>
-            <a:lvl6pPr marL="3047924" indent="0">
+            <a:lvl6pPr marL="4050106" indent="0">
               <a:buNone/>
-              <a:defRPr sz="2667"/>
+              <a:defRPr sz="3543"/>
             </a:lvl6pPr>
-            <a:lvl7pPr marL="3657509" indent="0">
+            <a:lvl7pPr marL="4860127" indent="0">
               <a:buNone/>
-              <a:defRPr sz="2667"/>
+              <a:defRPr sz="3543"/>
             </a:lvl7pPr>
-            <a:lvl8pPr marL="4267093" indent="0">
+            <a:lvl8pPr marL="5670149" indent="0">
               <a:buNone/>
-              <a:defRPr sz="2667"/>
+              <a:defRPr sz="3543"/>
             </a:lvl8pPr>
-            <a:lvl9pPr marL="4876678" indent="0">
+            <a:lvl9pPr marL="6480170" indent="0">
               <a:buNone/>
-              <a:defRPr sz="2667"/>
+              <a:defRPr sz="3543"/>
             </a:lvl9pPr>
           </a:lstStyle>
           <a:p>
@@ -2279,8 +2285,8 @@
         </p:nvSpPr>
         <p:spPr>
           <a:xfrm>
-            <a:off x="839788" y="3657600"/>
-            <a:ext cx="3932237" cy="6776156"/>
+            <a:off x="1115890" y="3657600"/>
+            <a:ext cx="5225063" cy="6776156"/>
           </a:xfrm>
         </p:spPr>
         <p:txBody>
@@ -2288,39 +2294,39 @@
           <a:lstStyle>
             <a:lvl1pPr marL="0" indent="0">
               <a:buNone/>
-              <a:defRPr sz="2133"/>
+              <a:defRPr sz="2835"/>
             </a:lvl1pPr>
-            <a:lvl2pPr marL="609585" indent="0">
+            <a:lvl2pPr marL="810021" indent="0">
               <a:buNone/>
-              <a:defRPr sz="1867"/>
+              <a:defRPr sz="2480"/>
             </a:lvl2pPr>
-            <a:lvl3pPr marL="1219170" indent="0">
+            <a:lvl3pPr marL="1620042" indent="0">
               <a:buNone/>
-              <a:defRPr sz="1600"/>
+              <a:defRPr sz="2126"/>
             </a:lvl3pPr>
-            <a:lvl4pPr marL="1828754" indent="0">
+            <a:lvl4pPr marL="2430064" indent="0">
               <a:buNone/>
-              <a:defRPr sz="1333"/>
+              <a:defRPr sz="1772"/>
             </a:lvl4pPr>
-            <a:lvl5pPr marL="2438339" indent="0">
+            <a:lvl5pPr marL="3240085" indent="0">
               <a:buNone/>
-              <a:defRPr sz="1333"/>
+              <a:defRPr sz="1772"/>
             </a:lvl5pPr>
-            <a:lvl6pPr marL="3047924" indent="0">
+            <a:lvl6pPr marL="4050106" indent="0">
               <a:buNone/>
-              <a:defRPr sz="1333"/>
+              <a:defRPr sz="1772"/>
             </a:lvl6pPr>
-            <a:lvl7pPr marL="3657509" indent="0">
+            <a:lvl7pPr marL="4860127" indent="0">
               <a:buNone/>
-              <a:defRPr sz="1333"/>
+              <a:defRPr sz="1772"/>
             </a:lvl7pPr>
-            <a:lvl8pPr marL="4267093" indent="0">
+            <a:lvl8pPr marL="5670149" indent="0">
               <a:buNone/>
-              <a:defRPr sz="1333"/>
+              <a:defRPr sz="1772"/>
             </a:lvl8pPr>
-            <a:lvl9pPr marL="4876678" indent="0">
+            <a:lvl9pPr marL="6480170" indent="0">
               <a:buNone/>
-              <a:defRPr sz="1333"/>
+              <a:defRPr sz="1772"/>
             </a:lvl9pPr>
           </a:lstStyle>
           <a:p>
@@ -2349,7 +2355,7 @@
           <a:p>
             <a:fld id="{CC2592F0-55DC-4691-9AD5-C3E112871D93}" type="datetimeFigureOut">
               <a:rPr lang="fr-FR" smtClean="0"/>
-              <a:t>11/08/2023</a:t>
+              <a:t>23/08/2023</a:t>
             </a:fld>
             <a:endParaRPr lang="fr-FR"/>
           </a:p>
@@ -2400,7 +2406,7 @@
     </p:spTree>
     <p:extLst>
       <p:ext uri="{BB962C8B-B14F-4D97-AF65-F5344CB8AC3E}">
-        <p14:creationId xmlns:p14="http://schemas.microsoft.com/office/powerpoint/2010/main" val="1771958903"/>
+        <p14:creationId xmlns:p14="http://schemas.microsoft.com/office/powerpoint/2010/main" val="311000414"/>
       </p:ext>
     </p:extLst>
   </p:cSld>
@@ -2444,8 +2450,8 @@
         </p:nvSpPr>
         <p:spPr>
           <a:xfrm>
-            <a:off x="838200" y="649114"/>
-            <a:ext cx="10515600" cy="2356556"/>
+            <a:off x="1113780" y="649114"/>
+            <a:ext cx="13972878" cy="2356556"/>
           </a:xfrm>
           <a:prstGeom prst="rect">
             <a:avLst/>
@@ -2477,8 +2483,8 @@
         </p:nvSpPr>
         <p:spPr>
           <a:xfrm>
-            <a:off x="838200" y="3245556"/>
-            <a:ext cx="10515600" cy="7735712"/>
+            <a:off x="1113780" y="3245556"/>
+            <a:ext cx="13972878" cy="7735712"/>
           </a:xfrm>
           <a:prstGeom prst="rect">
             <a:avLst/>
@@ -2539,8 +2545,8 @@
         </p:nvSpPr>
         <p:spPr>
           <a:xfrm>
-            <a:off x="838200" y="11300181"/>
-            <a:ext cx="2743200" cy="649111"/>
+            <a:off x="1113780" y="11300181"/>
+            <a:ext cx="3645099" cy="649111"/>
           </a:xfrm>
           <a:prstGeom prst="rect">
             <a:avLst/>
@@ -2550,7 +2556,7 @@
           <a:bodyPr vert="horz" lIns="91440" tIns="45720" rIns="91440" bIns="45720" rtlCol="0" anchor="ctr"/>
           <a:lstStyle>
             <a:lvl1pPr algn="l">
-              <a:defRPr sz="1600">
+              <a:defRPr sz="2126">
                 <a:solidFill>
                   <a:schemeClr val="tx1">
                     <a:tint val="75000"/>
@@ -2562,7 +2568,7 @@
           <a:p>
             <a:fld id="{CC2592F0-55DC-4691-9AD5-C3E112871D93}" type="datetimeFigureOut">
               <a:rPr lang="fr-FR" smtClean="0"/>
-              <a:t>11/08/2023</a:t>
+              <a:t>23/08/2023</a:t>
             </a:fld>
             <a:endParaRPr lang="fr-FR"/>
           </a:p>
@@ -2580,8 +2586,8 @@
         </p:nvSpPr>
         <p:spPr>
           <a:xfrm>
-            <a:off x="4038600" y="11300181"/>
-            <a:ext cx="4114800" cy="649111"/>
+            <a:off x="5366395" y="11300181"/>
+            <a:ext cx="5467648" cy="649111"/>
           </a:xfrm>
           <a:prstGeom prst="rect">
             <a:avLst/>
@@ -2591,7 +2597,7 @@
           <a:bodyPr vert="horz" lIns="91440" tIns="45720" rIns="91440" bIns="45720" rtlCol="0" anchor="ctr"/>
           <a:lstStyle>
             <a:lvl1pPr algn="ctr">
-              <a:defRPr sz="1600">
+              <a:defRPr sz="2126">
                 <a:solidFill>
                   <a:schemeClr val="tx1">
                     <a:tint val="75000"/>
@@ -2617,8 +2623,8 @@
         </p:nvSpPr>
         <p:spPr>
           <a:xfrm>
-            <a:off x="8610600" y="11300181"/>
-            <a:ext cx="2743200" cy="649111"/>
+            <a:off x="11441559" y="11300181"/>
+            <a:ext cx="3645099" cy="649111"/>
           </a:xfrm>
           <a:prstGeom prst="rect">
             <a:avLst/>
@@ -2628,7 +2634,7 @@
           <a:bodyPr vert="horz" lIns="91440" tIns="45720" rIns="91440" bIns="45720" rtlCol="0" anchor="ctr"/>
           <a:lstStyle>
             <a:lvl1pPr algn="r">
-              <a:defRPr sz="1600">
+              <a:defRPr sz="2126">
                 <a:solidFill>
                   <a:schemeClr val="tx1">
                     <a:tint val="75000"/>
@@ -2649,27 +2655,27 @@
     </p:spTree>
     <p:extLst>
       <p:ext uri="{BB962C8B-B14F-4D97-AF65-F5344CB8AC3E}">
-        <p14:creationId xmlns:p14="http://schemas.microsoft.com/office/powerpoint/2010/main" val="1038020480"/>
+        <p14:creationId xmlns:p14="http://schemas.microsoft.com/office/powerpoint/2010/main" val="17666023"/>
       </p:ext>
     </p:extLst>
   </p:cSld>
   <p:clrMap bg1="lt1" tx1="dk1" bg2="lt2" tx2="dk2" accent1="accent1" accent2="accent2" accent3="accent3" accent4="accent4" accent5="accent5" accent6="accent6" hlink="hlink" folHlink="folHlink"/>
   <p:sldLayoutIdLst>
-    <p:sldLayoutId id="2147483661" r:id="rId1"/>
-    <p:sldLayoutId id="2147483662" r:id="rId2"/>
-    <p:sldLayoutId id="2147483663" r:id="rId3"/>
-    <p:sldLayoutId id="2147483664" r:id="rId4"/>
-    <p:sldLayoutId id="2147483665" r:id="rId5"/>
-    <p:sldLayoutId id="2147483666" r:id="rId6"/>
-    <p:sldLayoutId id="2147483667" r:id="rId7"/>
-    <p:sldLayoutId id="2147483668" r:id="rId8"/>
-    <p:sldLayoutId id="2147483669" r:id="rId9"/>
-    <p:sldLayoutId id="2147483670" r:id="rId10"/>
-    <p:sldLayoutId id="2147483671" r:id="rId11"/>
+    <p:sldLayoutId id="2147483673" r:id="rId1"/>
+    <p:sldLayoutId id="2147483674" r:id="rId2"/>
+    <p:sldLayoutId id="2147483675" r:id="rId3"/>
+    <p:sldLayoutId id="2147483676" r:id="rId4"/>
+    <p:sldLayoutId id="2147483677" r:id="rId5"/>
+    <p:sldLayoutId id="2147483678" r:id="rId6"/>
+    <p:sldLayoutId id="2147483679" r:id="rId7"/>
+    <p:sldLayoutId id="2147483680" r:id="rId8"/>
+    <p:sldLayoutId id="2147483681" r:id="rId9"/>
+    <p:sldLayoutId id="2147483682" r:id="rId10"/>
+    <p:sldLayoutId id="2147483683" r:id="rId11"/>
   </p:sldLayoutIdLst>
   <p:txStyles>
     <p:titleStyle>
-      <a:lvl1pPr algn="l" defTabSz="1219170" rtl="0" eaLnBrk="1" latinLnBrk="0" hangingPunct="1">
+      <a:lvl1pPr algn="l" defTabSz="1620042" rtl="0" eaLnBrk="1" latinLnBrk="0" hangingPunct="1">
         <a:lnSpc>
           <a:spcPct val="90000"/>
         </a:lnSpc>
@@ -2677,7 +2683,7 @@
           <a:spcPct val="0"/>
         </a:spcBef>
         <a:buNone/>
-        <a:defRPr sz="5867" kern="1200">
+        <a:defRPr sz="7795" kern="1200">
           <a:solidFill>
             <a:schemeClr val="tx1"/>
           </a:solidFill>
@@ -2688,16 +2694,16 @@
       </a:lvl1pPr>
     </p:titleStyle>
     <p:bodyStyle>
-      <a:lvl1pPr marL="304792" indent="-304792" algn="l" defTabSz="1219170" rtl="0" eaLnBrk="1" latinLnBrk="0" hangingPunct="1">
+      <a:lvl1pPr marL="405011" indent="-405011" algn="l" defTabSz="1620042" rtl="0" eaLnBrk="1" latinLnBrk="0" hangingPunct="1">
         <a:lnSpc>
           <a:spcPct val="90000"/>
         </a:lnSpc>
         <a:spcBef>
-          <a:spcPts val="1333"/>
+          <a:spcPts val="1772"/>
         </a:spcBef>
         <a:buFont typeface="Arial" panose="020B0604020202020204" pitchFamily="34" charset="0"/>
         <a:buChar char="•"/>
-        <a:defRPr sz="3733" kern="1200">
+        <a:defRPr sz="4961" kern="1200">
           <a:solidFill>
             <a:schemeClr val="tx1"/>
           </a:solidFill>
@@ -2706,16 +2712,16 @@
           <a:cs typeface="+mn-cs"/>
         </a:defRPr>
       </a:lvl1pPr>
-      <a:lvl2pPr marL="914377" indent="-304792" algn="l" defTabSz="1219170" rtl="0" eaLnBrk="1" latinLnBrk="0" hangingPunct="1">
+      <a:lvl2pPr marL="1215032" indent="-405011" algn="l" defTabSz="1620042" rtl="0" eaLnBrk="1" latinLnBrk="0" hangingPunct="1">
         <a:lnSpc>
           <a:spcPct val="90000"/>
         </a:lnSpc>
         <a:spcBef>
-          <a:spcPts val="667"/>
+          <a:spcPts val="886"/>
         </a:spcBef>
         <a:buFont typeface="Arial" panose="020B0604020202020204" pitchFamily="34" charset="0"/>
         <a:buChar char="•"/>
-        <a:defRPr sz="3200" kern="1200">
+        <a:defRPr sz="4252" kern="1200">
           <a:solidFill>
             <a:schemeClr val="tx1"/>
           </a:solidFill>
@@ -2724,16 +2730,16 @@
           <a:cs typeface="+mn-cs"/>
         </a:defRPr>
       </a:lvl2pPr>
-      <a:lvl3pPr marL="1523962" indent="-304792" algn="l" defTabSz="1219170" rtl="0" eaLnBrk="1" latinLnBrk="0" hangingPunct="1">
+      <a:lvl3pPr marL="2025053" indent="-405011" algn="l" defTabSz="1620042" rtl="0" eaLnBrk="1" latinLnBrk="0" hangingPunct="1">
         <a:lnSpc>
           <a:spcPct val="90000"/>
         </a:lnSpc>
         <a:spcBef>
-          <a:spcPts val="667"/>
+          <a:spcPts val="886"/>
         </a:spcBef>
         <a:buFont typeface="Arial" panose="020B0604020202020204" pitchFamily="34" charset="0"/>
         <a:buChar char="•"/>
-        <a:defRPr sz="2667" kern="1200">
+        <a:defRPr sz="3543" kern="1200">
           <a:solidFill>
             <a:schemeClr val="tx1"/>
           </a:solidFill>
@@ -2742,16 +2748,16 @@
           <a:cs typeface="+mn-cs"/>
         </a:defRPr>
       </a:lvl3pPr>
-      <a:lvl4pPr marL="2133547" indent="-304792" algn="l" defTabSz="1219170" rtl="0" eaLnBrk="1" latinLnBrk="0" hangingPunct="1">
+      <a:lvl4pPr marL="2835074" indent="-405011" algn="l" defTabSz="1620042" rtl="0" eaLnBrk="1" latinLnBrk="0" hangingPunct="1">
         <a:lnSpc>
           <a:spcPct val="90000"/>
         </a:lnSpc>
         <a:spcBef>
-          <a:spcPts val="667"/>
+          <a:spcPts val="886"/>
         </a:spcBef>
         <a:buFont typeface="Arial" panose="020B0604020202020204" pitchFamily="34" charset="0"/>
         <a:buChar char="•"/>
-        <a:defRPr sz="2400" kern="1200">
+        <a:defRPr sz="3189" kern="1200">
           <a:solidFill>
             <a:schemeClr val="tx1"/>
           </a:solidFill>
@@ -2760,16 +2766,16 @@
           <a:cs typeface="+mn-cs"/>
         </a:defRPr>
       </a:lvl4pPr>
-      <a:lvl5pPr marL="2743131" indent="-304792" algn="l" defTabSz="1219170" rtl="0" eaLnBrk="1" latinLnBrk="0" hangingPunct="1">
+      <a:lvl5pPr marL="3645096" indent="-405011" algn="l" defTabSz="1620042" rtl="0" eaLnBrk="1" latinLnBrk="0" hangingPunct="1">
         <a:lnSpc>
           <a:spcPct val="90000"/>
         </a:lnSpc>
         <a:spcBef>
-          <a:spcPts val="667"/>
+          <a:spcPts val="886"/>
         </a:spcBef>
         <a:buFont typeface="Arial" panose="020B0604020202020204" pitchFamily="34" charset="0"/>
         <a:buChar char="•"/>
-        <a:defRPr sz="2400" kern="1200">
+        <a:defRPr sz="3189" kern="1200">
           <a:solidFill>
             <a:schemeClr val="tx1"/>
           </a:solidFill>
@@ -2778,16 +2784,16 @@
           <a:cs typeface="+mn-cs"/>
         </a:defRPr>
       </a:lvl5pPr>
-      <a:lvl6pPr marL="3352716" indent="-304792" algn="l" defTabSz="1219170" rtl="0" eaLnBrk="1" latinLnBrk="0" hangingPunct="1">
+      <a:lvl6pPr marL="4455117" indent="-405011" algn="l" defTabSz="1620042" rtl="0" eaLnBrk="1" latinLnBrk="0" hangingPunct="1">
         <a:lnSpc>
           <a:spcPct val="90000"/>
         </a:lnSpc>
         <a:spcBef>
-          <a:spcPts val="667"/>
+          <a:spcPts val="886"/>
         </a:spcBef>
         <a:buFont typeface="Arial" panose="020B0604020202020204" pitchFamily="34" charset="0"/>
         <a:buChar char="•"/>
-        <a:defRPr sz="2400" kern="1200">
+        <a:defRPr sz="3189" kern="1200">
           <a:solidFill>
             <a:schemeClr val="tx1"/>
           </a:solidFill>
@@ -2796,16 +2802,16 @@
           <a:cs typeface="+mn-cs"/>
         </a:defRPr>
       </a:lvl6pPr>
-      <a:lvl7pPr marL="3962301" indent="-304792" algn="l" defTabSz="1219170" rtl="0" eaLnBrk="1" latinLnBrk="0" hangingPunct="1">
+      <a:lvl7pPr marL="5265138" indent="-405011" algn="l" defTabSz="1620042" rtl="0" eaLnBrk="1" latinLnBrk="0" hangingPunct="1">
         <a:lnSpc>
           <a:spcPct val="90000"/>
         </a:lnSpc>
         <a:spcBef>
-          <a:spcPts val="667"/>
+          <a:spcPts val="886"/>
         </a:spcBef>
         <a:buFont typeface="Arial" panose="020B0604020202020204" pitchFamily="34" charset="0"/>
         <a:buChar char="•"/>
-        <a:defRPr sz="2400" kern="1200">
+        <a:defRPr sz="3189" kern="1200">
           <a:solidFill>
             <a:schemeClr val="tx1"/>
           </a:solidFill>
@@ -2814,16 +2820,16 @@
           <a:cs typeface="+mn-cs"/>
         </a:defRPr>
       </a:lvl7pPr>
-      <a:lvl8pPr marL="4571886" indent="-304792" algn="l" defTabSz="1219170" rtl="0" eaLnBrk="1" latinLnBrk="0" hangingPunct="1">
+      <a:lvl8pPr marL="6075159" indent="-405011" algn="l" defTabSz="1620042" rtl="0" eaLnBrk="1" latinLnBrk="0" hangingPunct="1">
         <a:lnSpc>
           <a:spcPct val="90000"/>
         </a:lnSpc>
         <a:spcBef>
-          <a:spcPts val="667"/>
+          <a:spcPts val="886"/>
         </a:spcBef>
         <a:buFont typeface="Arial" panose="020B0604020202020204" pitchFamily="34" charset="0"/>
         <a:buChar char="•"/>
-        <a:defRPr sz="2400" kern="1200">
+        <a:defRPr sz="3189" kern="1200">
           <a:solidFill>
             <a:schemeClr val="tx1"/>
           </a:solidFill>
@@ -2832,16 +2838,16 @@
           <a:cs typeface="+mn-cs"/>
         </a:defRPr>
       </a:lvl8pPr>
-      <a:lvl9pPr marL="5181470" indent="-304792" algn="l" defTabSz="1219170" rtl="0" eaLnBrk="1" latinLnBrk="0" hangingPunct="1">
+      <a:lvl9pPr marL="6885181" indent="-405011" algn="l" defTabSz="1620042" rtl="0" eaLnBrk="1" latinLnBrk="0" hangingPunct="1">
         <a:lnSpc>
           <a:spcPct val="90000"/>
         </a:lnSpc>
         <a:spcBef>
-          <a:spcPts val="667"/>
+          <a:spcPts val="886"/>
         </a:spcBef>
         <a:buFont typeface="Arial" panose="020B0604020202020204" pitchFamily="34" charset="0"/>
         <a:buChar char="•"/>
-        <a:defRPr sz="2400" kern="1200">
+        <a:defRPr sz="3189" kern="1200">
           <a:solidFill>
             <a:schemeClr val="tx1"/>
           </a:solidFill>
@@ -2855,8 +2861,8 @@
       <a:defPPr>
         <a:defRPr lang="en-US"/>
       </a:defPPr>
-      <a:lvl1pPr marL="0" algn="l" defTabSz="1219170" rtl="0" eaLnBrk="1" latinLnBrk="0" hangingPunct="1">
-        <a:defRPr sz="2400" kern="1200">
+      <a:lvl1pPr marL="0" algn="l" defTabSz="1620042" rtl="0" eaLnBrk="1" latinLnBrk="0" hangingPunct="1">
+        <a:defRPr sz="3189" kern="1200">
           <a:solidFill>
             <a:schemeClr val="tx1"/>
           </a:solidFill>
@@ -2865,8 +2871,8 @@
           <a:cs typeface="+mn-cs"/>
         </a:defRPr>
       </a:lvl1pPr>
-      <a:lvl2pPr marL="609585" algn="l" defTabSz="1219170" rtl="0" eaLnBrk="1" latinLnBrk="0" hangingPunct="1">
-        <a:defRPr sz="2400" kern="1200">
+      <a:lvl2pPr marL="810021" algn="l" defTabSz="1620042" rtl="0" eaLnBrk="1" latinLnBrk="0" hangingPunct="1">
+        <a:defRPr sz="3189" kern="1200">
           <a:solidFill>
             <a:schemeClr val="tx1"/>
           </a:solidFill>
@@ -2875,8 +2881,8 @@
           <a:cs typeface="+mn-cs"/>
         </a:defRPr>
       </a:lvl2pPr>
-      <a:lvl3pPr marL="1219170" algn="l" defTabSz="1219170" rtl="0" eaLnBrk="1" latinLnBrk="0" hangingPunct="1">
-        <a:defRPr sz="2400" kern="1200">
+      <a:lvl3pPr marL="1620042" algn="l" defTabSz="1620042" rtl="0" eaLnBrk="1" latinLnBrk="0" hangingPunct="1">
+        <a:defRPr sz="3189" kern="1200">
           <a:solidFill>
             <a:schemeClr val="tx1"/>
           </a:solidFill>
@@ -2885,8 +2891,8 @@
           <a:cs typeface="+mn-cs"/>
         </a:defRPr>
       </a:lvl3pPr>
-      <a:lvl4pPr marL="1828754" algn="l" defTabSz="1219170" rtl="0" eaLnBrk="1" latinLnBrk="0" hangingPunct="1">
-        <a:defRPr sz="2400" kern="1200">
+      <a:lvl4pPr marL="2430064" algn="l" defTabSz="1620042" rtl="0" eaLnBrk="1" latinLnBrk="0" hangingPunct="1">
+        <a:defRPr sz="3189" kern="1200">
           <a:solidFill>
             <a:schemeClr val="tx1"/>
           </a:solidFill>
@@ -2895,8 +2901,8 @@
           <a:cs typeface="+mn-cs"/>
         </a:defRPr>
       </a:lvl4pPr>
-      <a:lvl5pPr marL="2438339" algn="l" defTabSz="1219170" rtl="0" eaLnBrk="1" latinLnBrk="0" hangingPunct="1">
-        <a:defRPr sz="2400" kern="1200">
+      <a:lvl5pPr marL="3240085" algn="l" defTabSz="1620042" rtl="0" eaLnBrk="1" latinLnBrk="0" hangingPunct="1">
+        <a:defRPr sz="3189" kern="1200">
           <a:solidFill>
             <a:schemeClr val="tx1"/>
           </a:solidFill>
@@ -2905,8 +2911,8 @@
           <a:cs typeface="+mn-cs"/>
         </a:defRPr>
       </a:lvl5pPr>
-      <a:lvl6pPr marL="3047924" algn="l" defTabSz="1219170" rtl="0" eaLnBrk="1" latinLnBrk="0" hangingPunct="1">
-        <a:defRPr sz="2400" kern="1200">
+      <a:lvl6pPr marL="4050106" algn="l" defTabSz="1620042" rtl="0" eaLnBrk="1" latinLnBrk="0" hangingPunct="1">
+        <a:defRPr sz="3189" kern="1200">
           <a:solidFill>
             <a:schemeClr val="tx1"/>
           </a:solidFill>
@@ -2915,8 +2921,8 @@
           <a:cs typeface="+mn-cs"/>
         </a:defRPr>
       </a:lvl6pPr>
-      <a:lvl7pPr marL="3657509" algn="l" defTabSz="1219170" rtl="0" eaLnBrk="1" latinLnBrk="0" hangingPunct="1">
-        <a:defRPr sz="2400" kern="1200">
+      <a:lvl7pPr marL="4860127" algn="l" defTabSz="1620042" rtl="0" eaLnBrk="1" latinLnBrk="0" hangingPunct="1">
+        <a:defRPr sz="3189" kern="1200">
           <a:solidFill>
             <a:schemeClr val="tx1"/>
           </a:solidFill>
@@ -2925,8 +2931,8 @@
           <a:cs typeface="+mn-cs"/>
         </a:defRPr>
       </a:lvl7pPr>
-      <a:lvl8pPr marL="4267093" algn="l" defTabSz="1219170" rtl="0" eaLnBrk="1" latinLnBrk="0" hangingPunct="1">
-        <a:defRPr sz="2400" kern="1200">
+      <a:lvl8pPr marL="5670149" algn="l" defTabSz="1620042" rtl="0" eaLnBrk="1" latinLnBrk="0" hangingPunct="1">
+        <a:defRPr sz="3189" kern="1200">
           <a:solidFill>
             <a:schemeClr val="tx1"/>
           </a:solidFill>
@@ -2935,8 +2941,8 @@
           <a:cs typeface="+mn-cs"/>
         </a:defRPr>
       </a:lvl8pPr>
-      <a:lvl9pPr marL="4876678" algn="l" defTabSz="1219170" rtl="0" eaLnBrk="1" latinLnBrk="0" hangingPunct="1">
-        <a:defRPr sz="2400" kern="1200">
+      <a:lvl9pPr marL="6480170" algn="l" defTabSz="1620042" rtl="0" eaLnBrk="1" latinLnBrk="0" hangingPunct="1">
+        <a:defRPr sz="3189" kern="1200">
           <a:solidFill>
             <a:schemeClr val="tx1"/>
           </a:solidFill>
@@ -2975,7 +2981,7 @@
         </p:nvSpPr>
         <p:spPr>
           <a:xfrm>
-            <a:off x="2258568" y="5693664"/>
+            <a:off x="4262787" y="5693664"/>
             <a:ext cx="2551176" cy="3337560"/>
           </a:xfrm>
           <a:prstGeom prst="rect">
@@ -3048,7 +3054,7 @@
         </p:blipFill>
         <p:spPr>
           <a:xfrm>
-            <a:off x="662678" y="2873806"/>
+            <a:off x="2666897" y="2873806"/>
             <a:ext cx="626626" cy="469970"/>
           </a:xfrm>
           <a:prstGeom prst="rect">
@@ -3078,7 +3084,7 @@
         </p:blipFill>
         <p:spPr>
           <a:xfrm>
-            <a:off x="662678" y="3343776"/>
+            <a:off x="2666897" y="3343776"/>
             <a:ext cx="626626" cy="469970"/>
           </a:xfrm>
           <a:prstGeom prst="rect">
@@ -3108,7 +3114,7 @@
         </p:blipFill>
         <p:spPr>
           <a:xfrm>
-            <a:off x="644390" y="4048731"/>
+            <a:off x="2648609" y="4048731"/>
             <a:ext cx="626626" cy="469970"/>
           </a:xfrm>
           <a:prstGeom prst="rect">
@@ -3124,7 +3130,7 @@
         </p:nvSpPr>
         <p:spPr>
           <a:xfrm rot="16200000">
-            <a:off x="710057" y="3746573"/>
+            <a:off x="2714276" y="3746573"/>
             <a:ext cx="420624" cy="369332"/>
           </a:xfrm>
           <a:prstGeom prst="rect">
@@ -3154,7 +3160,7 @@
         </p:nvSpPr>
         <p:spPr>
           <a:xfrm>
-            <a:off x="1385195" y="2921423"/>
+            <a:off x="3389414" y="2921423"/>
             <a:ext cx="128016" cy="1481328"/>
           </a:xfrm>
           <a:prstGeom prst="rightBrace">
@@ -3197,7 +3203,7 @@
         </p:nvSpPr>
         <p:spPr>
           <a:xfrm>
-            <a:off x="1573652" y="3403907"/>
+            <a:off x="3577871" y="3403908"/>
             <a:ext cx="1654180" cy="461665"/>
           </a:xfrm>
           <a:prstGeom prst="rect">
@@ -3213,11 +3219,7 @@
           <a:p>
             <a:r>
               <a:rPr lang="fr-FR" sz="1200" b="1" dirty="0"/>
-              <a:t>177 </a:t>
-            </a:r>
-            <a:r>
-              <a:rPr lang="fr-FR" sz="1200" b="1" dirty="0"/>
-              <a:t>génotypes</a:t>
+              <a:t>177 génotypes</a:t>
             </a:r>
           </a:p>
           <a:p>
@@ -3236,7 +3238,7 @@
         </p:nvSpPr>
         <p:spPr>
           <a:xfrm>
-            <a:off x="264914" y="2933936"/>
+            <a:off x="2269133" y="2933936"/>
             <a:ext cx="539496" cy="338554"/>
           </a:xfrm>
           <a:prstGeom prst="rect">
@@ -3265,7 +3267,7 @@
         </p:nvSpPr>
         <p:spPr>
           <a:xfrm>
-            <a:off x="264783" y="3403906"/>
+            <a:off x="2269002" y="3403906"/>
             <a:ext cx="539496" cy="338554"/>
           </a:xfrm>
           <a:prstGeom prst="rect">
@@ -3294,7 +3296,7 @@
         </p:nvSpPr>
         <p:spPr>
           <a:xfrm>
-            <a:off x="128017" y="4141552"/>
+            <a:off x="2132237" y="4141553"/>
             <a:ext cx="727293" cy="307777"/>
           </a:xfrm>
           <a:prstGeom prst="rect">
@@ -3312,7 +3314,6 @@
               <a:rPr lang="fr-FR" sz="1400" b="1" dirty="0"/>
               <a:t>G177</a:t>
             </a:r>
-            <a:endParaRPr lang="fr-FR" sz="1400" b="1" dirty="0"/>
           </a:p>
         </p:txBody>
       </p:sp>
@@ -3324,7 +3325,7 @@
         </p:nvSpPr>
         <p:spPr>
           <a:xfrm>
-            <a:off x="3481388" y="2714261"/>
+            <a:off x="5485608" y="2714262"/>
             <a:ext cx="1328357" cy="1840955"/>
           </a:xfrm>
           <a:prstGeom prst="rect">
@@ -3382,7 +3383,7 @@
         </p:nvCxnSpPr>
         <p:spPr>
           <a:xfrm flipV="1">
-            <a:off x="3227833" y="3634739"/>
+            <a:off x="5232053" y="3634740"/>
             <a:ext cx="253555" cy="1"/>
           </a:xfrm>
           <a:prstGeom prst="straightConnector1">
@@ -3421,7 +3422,7 @@
         </p:nvCxnSpPr>
         <p:spPr>
           <a:xfrm flipV="1">
-            <a:off x="4809744" y="3634738"/>
+            <a:off x="6813963" y="3634739"/>
             <a:ext cx="1426282" cy="1"/>
           </a:xfrm>
           <a:prstGeom prst="straightConnector1">
@@ -3457,7 +3458,7 @@
         </p:nvSpPr>
         <p:spPr>
           <a:xfrm>
-            <a:off x="4846138" y="3710664"/>
+            <a:off x="6850357" y="3710664"/>
             <a:ext cx="1353494" cy="523220"/>
           </a:xfrm>
           <a:prstGeom prst="rect">
@@ -3486,7 +3487,7 @@
         </p:nvSpPr>
         <p:spPr>
           <a:xfrm>
-            <a:off x="6236027" y="3059081"/>
+            <a:off x="8240247" y="3059081"/>
             <a:ext cx="1328357" cy="1151312"/>
           </a:xfrm>
           <a:prstGeom prst="rect">
@@ -3696,7 +3697,7 @@
         </p:nvSpPr>
         <p:spPr>
           <a:xfrm>
-            <a:off x="390863" y="3654609"/>
+            <a:off x="2395082" y="3654609"/>
             <a:ext cx="3346704" cy="1938992"/>
           </a:xfrm>
           <a:prstGeom prst="rect">
@@ -3796,7 +3797,7 @@
         </p:nvSpPr>
         <p:spPr>
           <a:xfrm>
-            <a:off x="411961" y="301961"/>
+            <a:off x="2416180" y="301962"/>
             <a:ext cx="3346704" cy="3108543"/>
           </a:xfrm>
           <a:prstGeom prst="rect">
@@ -3918,7 +3919,7 @@
         </p:nvGrpSpPr>
         <p:grpSpPr>
           <a:xfrm>
-            <a:off x="411961" y="5854602"/>
+            <a:off x="2416180" y="5854603"/>
             <a:ext cx="3346704" cy="2585323"/>
             <a:chOff x="411961" y="5679098"/>
             <a:chExt cx="3346704" cy="2585323"/>
@@ -4211,7 +4212,7 @@
         </p:nvGrpSpPr>
         <p:grpSpPr>
           <a:xfrm>
-            <a:off x="4250588" y="301961"/>
+            <a:off x="6254808" y="301962"/>
             <a:ext cx="7796269" cy="5632311"/>
             <a:chOff x="4947274" y="218595"/>
             <a:chExt cx="7796269" cy="5632311"/>
@@ -4245,15 +4246,15 @@
             <a:lstStyle/>
             <a:p>
               <a:r>
-                <a:rPr lang="fr-FR" b="1" dirty="0" smtClean="0"/>
+                <a:rPr lang="fr-FR" b="1" dirty="0"/>
                 <a:t>Etape 4 : sélection sur épi (répété 100 fois pour chaque combinaison NEO x </a:t>
               </a:r>
               <a:r>
-                <a:rPr lang="fr-FR" b="1" dirty="0" err="1" smtClean="0"/>
+                <a:rPr lang="fr-FR" b="1" dirty="0" err="1"/>
                 <a:t>nsel</a:t>
               </a:r>
               <a:r>
-                <a:rPr lang="fr-FR" b="1" dirty="0" smtClean="0"/>
+                <a:rPr lang="fr-FR" b="1" dirty="0"/>
                 <a:t>)</a:t>
               </a:r>
             </a:p>
@@ -4261,55 +4262,55 @@
               <a:endParaRPr lang="fr-FR" dirty="0"/>
             </a:p>
             <a:p>
-              <a:endParaRPr lang="fr-FR" dirty="0" smtClean="0"/>
-            </a:p>
-            <a:p>
               <a:endParaRPr lang="fr-FR" dirty="0"/>
             </a:p>
             <a:p>
-              <a:endParaRPr lang="fr-FR" dirty="0" smtClean="0"/>
-            </a:p>
-            <a:p>
               <a:endParaRPr lang="fr-FR" dirty="0"/>
             </a:p>
             <a:p>
-              <a:endParaRPr lang="fr-FR" dirty="0" smtClean="0"/>
-            </a:p>
-            <a:p>
               <a:endParaRPr lang="fr-FR" dirty="0"/>
             </a:p>
             <a:p>
-              <a:endParaRPr lang="fr-FR" dirty="0" smtClean="0"/>
-            </a:p>
-            <a:p>
               <a:endParaRPr lang="fr-FR" dirty="0"/>
             </a:p>
             <a:p>
-              <a:endParaRPr lang="fr-FR" dirty="0" smtClean="0"/>
-            </a:p>
-            <a:p>
               <a:endParaRPr lang="fr-FR" dirty="0"/>
             </a:p>
             <a:p>
-              <a:endParaRPr lang="fr-FR" dirty="0" smtClean="0"/>
-            </a:p>
-            <a:p>
               <a:endParaRPr lang="fr-FR" dirty="0"/>
             </a:p>
             <a:p>
-              <a:endParaRPr lang="fr-FR" dirty="0" smtClean="0"/>
-            </a:p>
-            <a:p>
               <a:endParaRPr lang="fr-FR" dirty="0"/>
             </a:p>
             <a:p>
-              <a:endParaRPr lang="fr-FR" dirty="0" smtClean="0"/>
-            </a:p>
-            <a:p>
               <a:endParaRPr lang="fr-FR" dirty="0"/>
             </a:p>
             <a:p>
-              <a:endParaRPr lang="fr-FR" dirty="0" smtClean="0"/>
+              <a:endParaRPr lang="fr-FR" dirty="0"/>
+            </a:p>
+            <a:p>
+              <a:endParaRPr lang="fr-FR" dirty="0"/>
+            </a:p>
+            <a:p>
+              <a:endParaRPr lang="fr-FR" dirty="0"/>
+            </a:p>
+            <a:p>
+              <a:endParaRPr lang="fr-FR" dirty="0"/>
+            </a:p>
+            <a:p>
+              <a:endParaRPr lang="fr-FR" dirty="0"/>
+            </a:p>
+            <a:p>
+              <a:endParaRPr lang="fr-FR" dirty="0"/>
+            </a:p>
+            <a:p>
+              <a:endParaRPr lang="fr-FR" dirty="0"/>
+            </a:p>
+            <a:p>
+              <a:endParaRPr lang="fr-FR" dirty="0"/>
+            </a:p>
+            <a:p>
+              <a:endParaRPr lang="fr-FR" dirty="0"/>
             </a:p>
             <a:p>
               <a:endParaRPr lang="fr-FR" dirty="0"/>
@@ -4563,7 +4564,6 @@
                 <a:rPr lang="fr-FR" sz="1400" b="1" dirty="0"/>
                 <a:t>G177</a:t>
               </a:r>
-              <a:endParaRPr lang="fr-FR" sz="1400" b="1" dirty="0"/>
             </a:p>
           </p:txBody>
         </p:sp>
@@ -4630,7 +4630,7 @@
                 <a:t>Moyenne de la taille des grains par </a:t>
               </a:r>
               <a:r>
-                <a:rPr lang="fr-FR" sz="1600" dirty="0" smtClean="0">
+                <a:rPr lang="fr-FR" sz="1600" dirty="0">
                   <a:solidFill>
                     <a:schemeClr val="tx1"/>
                   </a:solidFill>
@@ -4747,15 +4747,15 @@
             <a:p>
               <a:pPr algn="ctr"/>
               <a:r>
-                <a:rPr lang="fr-FR" sz="1400" dirty="0" smtClean="0"/>
+                <a:rPr lang="fr-FR" sz="1400" dirty="0"/>
                 <a:t>Echantillonnage </a:t>
               </a:r>
               <a:r>
-                <a:rPr lang="fr-FR" sz="1400" b="1" dirty="0" smtClean="0"/>
+                <a:rPr lang="fr-FR" sz="1400" b="1" dirty="0"/>
                 <a:t>aléatoire</a:t>
               </a:r>
               <a:r>
-                <a:rPr lang="fr-FR" sz="1400" dirty="0" smtClean="0"/>
+                <a:rPr lang="fr-FR" sz="1400" dirty="0"/>
                 <a:t> </a:t>
               </a:r>
               <a:r>
@@ -4820,7 +4820,7 @@
             <a:p>
               <a:pPr algn="ctr"/>
               <a:r>
-                <a:rPr lang="fr-FR" sz="1600" dirty="0" smtClean="0">
+                <a:rPr lang="fr-FR" sz="1600" dirty="0">
                   <a:solidFill>
                     <a:schemeClr val="tx1"/>
                   </a:solidFill>
@@ -4893,7 +4893,7 @@
             <a:p>
               <a:pPr algn="ctr"/>
               <a:r>
-                <a:rPr lang="fr-FR" sz="1600" dirty="0" smtClean="0">
+                <a:rPr lang="fr-FR" sz="1600" dirty="0">
                   <a:solidFill>
                     <a:schemeClr val="tx1"/>
                   </a:solidFill>
@@ -4977,11 +4977,11 @@
                 <a:t>n</a:t>
               </a:r>
               <a:r>
-                <a:rPr lang="fr-FR" sz="1400" dirty="0" err="1" smtClean="0"/>
+                <a:rPr lang="fr-FR" sz="1400" dirty="0" err="1"/>
                 <a:t>sel</a:t>
               </a:r>
               <a:r>
-                <a:rPr lang="fr-FR" sz="1400" dirty="0" smtClean="0"/>
+                <a:rPr lang="fr-FR" sz="1400" dirty="0"/>
                 <a:t>/NGE génotypes avec les plus grandes moyennes</a:t>
               </a:r>
               <a:endParaRPr lang="fr-FR" sz="1400" dirty="0"/>
@@ -5091,7 +5091,7 @@
                 <a:t>Population sélectionnée sur </a:t>
               </a:r>
               <a:r>
-                <a:rPr lang="fr-FR" sz="1600" dirty="0" smtClean="0"/>
+                <a:rPr lang="fr-FR" sz="1600" dirty="0"/>
                 <a:t>épi</a:t>
               </a:r>
               <a:endParaRPr lang="fr-FR" sz="1600" dirty="0"/>
@@ -5122,7 +5122,7 @@
             <a:p>
               <a:pPr algn="ctr"/>
               <a:r>
-                <a:rPr lang="fr-FR" sz="1400" dirty="0" smtClean="0"/>
+                <a:rPr lang="fr-FR" sz="1400" dirty="0"/>
                 <a:t>Chaque </a:t>
               </a:r>
               <a:r>
@@ -5130,7 +5130,7 @@
                 <a:t>lot de 12 grain est considéré comme 1 épi (il y a donc 1 épi par génotype</a:t>
               </a:r>
               <a:r>
-                <a:rPr lang="fr-FR" sz="1400" dirty="0" smtClean="0"/>
+                <a:rPr lang="fr-FR" sz="1400" dirty="0"/>
                 <a:t>)</a:t>
               </a:r>
               <a:endParaRPr lang="fr-FR" sz="1400" dirty="0"/>
@@ -5336,7 +5336,7 @@
                 <a:t>12 grains par </a:t>
               </a:r>
               <a:r>
-                <a:rPr lang="fr-FR" sz="1400" dirty="0" smtClean="0"/>
+                <a:rPr lang="fr-FR" sz="1400" dirty="0"/>
                 <a:t>génotype</a:t>
               </a:r>
               <a:endParaRPr lang="fr-FR" dirty="0"/>
@@ -5352,7 +5352,7 @@
         </p:nvGrpSpPr>
         <p:grpSpPr>
           <a:xfrm>
-            <a:off x="4250588" y="6421072"/>
+            <a:off x="6254808" y="6421073"/>
             <a:ext cx="7796269" cy="4524315"/>
             <a:chOff x="4250588" y="6421072"/>
             <a:chExt cx="7796269" cy="4524315"/>
@@ -5386,15 +5386,15 @@
             <a:lstStyle/>
             <a:p>
               <a:r>
-                <a:rPr lang="fr-FR" b="1" dirty="0" smtClean="0"/>
+                <a:rPr lang="fr-FR" b="1" dirty="0"/>
                 <a:t>Etape 5 : estimation des progrès effectués (répété 100 fois pour chaque combinaison de NEO x </a:t>
               </a:r>
               <a:r>
-                <a:rPr lang="fr-FR" b="1" dirty="0" err="1" smtClean="0"/>
+                <a:rPr lang="fr-FR" b="1" dirty="0" err="1"/>
                 <a:t>nsel</a:t>
               </a:r>
               <a:r>
-                <a:rPr lang="fr-FR" b="1" dirty="0" smtClean="0"/>
+                <a:rPr lang="fr-FR" b="1" dirty="0"/>
                 <a:t>)</a:t>
               </a:r>
             </a:p>
@@ -5402,37 +5402,37 @@
               <a:endParaRPr lang="fr-FR" b="1" dirty="0"/>
             </a:p>
             <a:p>
-              <a:endParaRPr lang="fr-FR" b="1" dirty="0" smtClean="0"/>
-            </a:p>
-            <a:p>
               <a:endParaRPr lang="fr-FR" b="1" dirty="0"/>
             </a:p>
             <a:p>
-              <a:endParaRPr lang="fr-FR" b="1" dirty="0" smtClean="0"/>
-            </a:p>
-            <a:p>
               <a:endParaRPr lang="fr-FR" b="1" dirty="0"/>
             </a:p>
             <a:p>
-              <a:endParaRPr lang="fr-FR" b="1" dirty="0" smtClean="0"/>
-            </a:p>
-            <a:p>
               <a:endParaRPr lang="fr-FR" b="1" dirty="0"/>
             </a:p>
             <a:p>
-              <a:endParaRPr lang="fr-FR" b="1" dirty="0" smtClean="0"/>
-            </a:p>
-            <a:p>
               <a:endParaRPr lang="fr-FR" b="1" dirty="0"/>
             </a:p>
             <a:p>
-              <a:endParaRPr lang="fr-FR" b="1" dirty="0" smtClean="0"/>
-            </a:p>
-            <a:p>
               <a:endParaRPr lang="fr-FR" b="1" dirty="0"/>
             </a:p>
             <a:p>
-              <a:endParaRPr lang="fr-FR" b="1" dirty="0" smtClean="0"/>
+              <a:endParaRPr lang="fr-FR" b="1" dirty="0"/>
+            </a:p>
+            <a:p>
+              <a:endParaRPr lang="fr-FR" b="1" dirty="0"/>
+            </a:p>
+            <a:p>
+              <a:endParaRPr lang="fr-FR" b="1" dirty="0"/>
+            </a:p>
+            <a:p>
+              <a:endParaRPr lang="fr-FR" b="1" dirty="0"/>
+            </a:p>
+            <a:p>
+              <a:endParaRPr lang="fr-FR" b="1" dirty="0"/>
+            </a:p>
+            <a:p>
+              <a:endParaRPr lang="fr-FR" b="1" dirty="0"/>
             </a:p>
             <a:p>
               <a:endParaRPr lang="fr-FR" b="1" dirty="0"/>
@@ -5613,7 +5613,7 @@
                   <a:t>Population sélectionnée sur </a:t>
                 </a:r>
                 <a:r>
-                  <a:rPr lang="fr-FR" sz="1600" dirty="0" smtClean="0"/>
+                  <a:rPr lang="fr-FR" sz="1600" dirty="0"/>
                   <a:t>épi</a:t>
                 </a:r>
                 <a:endParaRPr lang="fr-FR" sz="1600" dirty="0"/>
@@ -5621,8 +5621,8 @@
             </p:txBody>
           </p:sp>
         </p:grpSp>
-        <mc:AlternateContent xmlns:mc="http://schemas.openxmlformats.org/markup-compatibility/2006">
-          <mc:Choice xmlns:a14="http://schemas.microsoft.com/office/drawing/2010/main" Requires="a14">
+        <mc:AlternateContent xmlns:mc="http://schemas.openxmlformats.org/markup-compatibility/2006" xmlns:a14="http://schemas.microsoft.com/office/drawing/2010/main">
+          <mc:Choice Requires="a14">
             <p:sp>
               <p:nvSpPr>
                 <p:cNvPr id="107" name="Rectangle 106"/>
@@ -5644,6 +5644,7 @@
                 </a:bodyPr>
                 <a:lstStyle/>
                 <a:p>
+                  <a:pPr/>
                   <a14:m>
                     <m:oMathPara xmlns:m="http://schemas.openxmlformats.org/officeDocument/2006/math">
                       <m:oMathParaPr>
@@ -5653,7 +5654,7 @@
                         <m:sSub>
                           <m:sSubPr>
                             <m:ctrlPr>
-                              <a:rPr lang="fr-FR">
+                              <a:rPr lang="fr-FR" i="1">
                                 <a:latin typeface="Cambria Math" panose="02040503050406030204" pitchFamily="18" charset="0"/>
                               </a:rPr>
                             </m:ctrlPr>
@@ -5676,7 +5677,7 @@
                           </m:sub>
                         </m:sSub>
                         <m:r>
-                          <a:rPr lang="fr-FR" i="0">
+                          <a:rPr lang="fr-FR">
                             <a:latin typeface="Cambria Math" panose="02040503050406030204" pitchFamily="18" charset="0"/>
                           </a:rPr>
                           <m:t>=µ+</m:t>
@@ -5713,7 +5714,7 @@
                           </m:sub>
                         </m:sSub>
                         <m:r>
-                          <a:rPr lang="fr-FR" i="0">
+                          <a:rPr lang="fr-FR">
                             <a:latin typeface="Cambria Math" panose="02040503050406030204" pitchFamily="18" charset="0"/>
                           </a:rPr>
                           <m:t>+</m:t>
@@ -5750,7 +5751,7 @@
                           </m:sub>
                         </m:sSub>
                         <m:r>
-                          <a:rPr lang="fr-FR" i="0">
+                          <a:rPr lang="fr-FR">
                             <a:latin typeface="Cambria Math" panose="02040503050406030204" pitchFamily="18" charset="0"/>
                           </a:rPr>
                           <m:t>+</m:t>
@@ -5788,7 +5789,7 @@
               </p:txBody>
             </p:sp>
           </mc:Choice>
-          <mc:Fallback>
+          <mc:Fallback xmlns="">
             <p:sp>
               <p:nvSpPr>
                 <p:cNvPr id="107" name="Rectangle 106"/>
@@ -5899,8 +5900,8 @@
             </a:fontRef>
           </p:style>
         </p:cxnSp>
-        <mc:AlternateContent xmlns:mc="http://schemas.openxmlformats.org/markup-compatibility/2006">
-          <mc:Choice xmlns:a14="http://schemas.microsoft.com/office/drawing/2010/main" Requires="a14">
+        <mc:AlternateContent xmlns:mc="http://schemas.openxmlformats.org/markup-compatibility/2006" xmlns:a14="http://schemas.microsoft.com/office/drawing/2010/main">
+          <mc:Choice Requires="a14">
             <p:sp>
               <p:nvSpPr>
                 <p:cNvPr id="117" name="Rectangle 116"/>
@@ -5922,6 +5923,7 @@
                 </a:bodyPr>
                 <a:lstStyle/>
                 <a:p>
+                  <a:pPr/>
                   <a14:m>
                     <m:oMathPara xmlns:m="http://schemas.openxmlformats.org/officeDocument/2006/math">
                       <m:oMathParaPr>
@@ -5929,7 +5931,7 @@
                       </m:oMathParaPr>
                       <m:oMath xmlns:m="http://schemas.openxmlformats.org/officeDocument/2006/math">
                         <m:r>
-                          <a:rPr lang="fr-FR" i="1" smtClean="0">
+                          <a:rPr lang="fr-FR" i="1">
                             <a:latin typeface="Cambria Math" panose="02040503050406030204" pitchFamily="18" charset="0"/>
                           </a:rPr>
                           <m:t>𝑆𝐸𝐿𝐸𝐶𝑇𝐼𝑂</m:t>
@@ -5952,7 +5954,7 @@
                           </m:e>
                           <m:sub>
                             <m:r>
-                              <a:rPr lang="fr-FR" b="0" i="1" smtClean="0">
+                              <a:rPr lang="fr-FR" i="1">
                                 <a:latin typeface="Cambria Math" panose="02040503050406030204" pitchFamily="18" charset="0"/>
                               </a:rPr>
                               <m:t>𝐺𝑅𝐴𝐼𝑁</m:t>
@@ -5962,15 +5964,15 @@
                       </m:oMath>
                     </m:oMathPara>
                   </a14:m>
-                  <a:endParaRPr lang="fr-FR" dirty="0" smtClean="0"/>
+                  <a:endParaRPr lang="fr-FR" dirty="0"/>
                 </a:p>
                 <a:p>
                   <a:r>
-                    <a:rPr lang="fr-FR" dirty="0" smtClean="0"/>
+                    <a:rPr lang="fr-FR" dirty="0"/>
                     <a:t>= R</a:t>
                   </a:r>
                   <a:r>
-                    <a:rPr lang="fr-FR" baseline="-25000" dirty="0" smtClean="0"/>
+                    <a:rPr lang="fr-FR" baseline="-25000" dirty="0"/>
                     <a:t>GRAIN</a:t>
                   </a:r>
                   <a:endParaRPr lang="fr-FR" dirty="0"/>
@@ -5978,7 +5980,7 @@
               </p:txBody>
             </p:sp>
           </mc:Choice>
-          <mc:Fallback>
+          <mc:Fallback xmlns="">
             <p:sp>
               <p:nvSpPr>
                 <p:cNvPr id="117" name="Rectangle 116"/>
@@ -6017,8 +6019,8 @@
             </p:sp>
           </mc:Fallback>
         </mc:AlternateContent>
-        <mc:AlternateContent xmlns:mc="http://schemas.openxmlformats.org/markup-compatibility/2006">
-          <mc:Choice xmlns:a14="http://schemas.microsoft.com/office/drawing/2010/main" Requires="a14">
+        <mc:AlternateContent xmlns:mc="http://schemas.openxmlformats.org/markup-compatibility/2006" xmlns:a14="http://schemas.microsoft.com/office/drawing/2010/main">
+          <mc:Choice Requires="a14">
             <p:sp>
               <p:nvSpPr>
                 <p:cNvPr id="118" name="Rectangle 117"/>
@@ -6040,6 +6042,7 @@
                 </a:bodyPr>
                 <a:lstStyle/>
                 <a:p>
+                  <a:pPr/>
                   <a14:m>
                     <m:oMathPara xmlns:m="http://schemas.openxmlformats.org/officeDocument/2006/math">
                       <m:oMathParaPr>
@@ -6047,7 +6050,7 @@
                       </m:oMathParaPr>
                       <m:oMath xmlns:m="http://schemas.openxmlformats.org/officeDocument/2006/math">
                         <m:r>
-                          <a:rPr lang="fr-FR" i="1" smtClean="0">
+                          <a:rPr lang="fr-FR" i="1">
                             <a:latin typeface="Cambria Math" panose="02040503050406030204" pitchFamily="18" charset="0"/>
                           </a:rPr>
                           <m:t>𝑆𝐸𝐿𝐸𝐶𝑇𝐼𝑂</m:t>
@@ -6070,7 +6073,7 @@
                           </m:e>
                           <m:sub>
                             <m:r>
-                              <a:rPr lang="fr-FR" b="0" i="1" smtClean="0">
+                              <a:rPr lang="fr-FR" i="1">
                                 <a:latin typeface="Cambria Math" panose="02040503050406030204" pitchFamily="18" charset="0"/>
                               </a:rPr>
                               <m:t>𝐸𝑃𝐼</m:t>
@@ -6080,15 +6083,15 @@
                       </m:oMath>
                     </m:oMathPara>
                   </a14:m>
-                  <a:endParaRPr lang="fr-FR" dirty="0" smtClean="0"/>
+                  <a:endParaRPr lang="fr-FR" dirty="0"/>
                 </a:p>
                 <a:p>
                   <a:r>
-                    <a:rPr lang="fr-FR" dirty="0" smtClean="0"/>
+                    <a:rPr lang="fr-FR" dirty="0"/>
                     <a:t>= R</a:t>
                   </a:r>
                   <a:r>
-                    <a:rPr lang="fr-FR" baseline="-25000" dirty="0" smtClean="0"/>
+                    <a:rPr lang="fr-FR" baseline="-25000" dirty="0"/>
                     <a:t>EPI</a:t>
                   </a:r>
                   <a:endParaRPr lang="fr-FR" dirty="0"/>
@@ -6096,7 +6099,7 @@
               </p:txBody>
             </p:sp>
           </mc:Choice>
-          <mc:Fallback>
+          <mc:Fallback xmlns="">
             <p:sp>
               <p:nvSpPr>
                 <p:cNvPr id="118" name="Rectangle 117"/>
@@ -6140,6 +6143,2826 @@
     <p:extLst>
       <p:ext uri="{BB962C8B-B14F-4D97-AF65-F5344CB8AC3E}">
         <p14:creationId xmlns:p14="http://schemas.microsoft.com/office/powerpoint/2010/main" val="2777358025"/>
+      </p:ext>
+    </p:extLst>
+  </p:cSld>
+  <p:clrMapOvr>
+    <a:masterClrMapping/>
+  </p:clrMapOvr>
+  <p:timing>
+    <p:tnLst>
+      <p:par>
+        <p:cTn id="1" dur="indefinite" restart="never" nodeType="tmRoot"/>
+      </p:par>
+    </p:tnLst>
+  </p:timing>
+</p:sld>
+</file>
+
+<file path=ppt/slides/slide3.xml><?xml version="1.0" encoding="utf-8"?>
+<p:sld xmlns:a="http://schemas.openxmlformats.org/drawingml/2006/main" xmlns:r="http://schemas.openxmlformats.org/officeDocument/2006/relationships" xmlns:p="http://schemas.openxmlformats.org/presentationml/2006/main">
+  <p:cSld>
+    <p:spTree>
+      <p:nvGrpSpPr>
+        <p:cNvPr id="1" name=""/>
+        <p:cNvGrpSpPr/>
+        <p:nvPr/>
+      </p:nvGrpSpPr>
+      <p:grpSpPr>
+        <a:xfrm>
+          <a:off x="0" y="0"/>
+          <a:ext cx="0" cy="0"/>
+          <a:chOff x="0" y="0"/>
+          <a:chExt cx="0" cy="0"/>
+        </a:xfrm>
+      </p:grpSpPr>
+      <p:grpSp>
+        <p:nvGrpSpPr>
+          <p:cNvPr id="9" name="Groupe 8"/>
+          <p:cNvGrpSpPr/>
+          <p:nvPr/>
+        </p:nvGrpSpPr>
+        <p:grpSpPr>
+          <a:xfrm>
+            <a:off x="130076" y="154636"/>
+            <a:ext cx="7796269" cy="10156627"/>
+            <a:chOff x="4250588" y="301961"/>
+            <a:chExt cx="7796269" cy="10156627"/>
+          </a:xfrm>
+        </p:grpSpPr>
+        <p:sp>
+          <p:nvSpPr>
+            <p:cNvPr id="100" name="ZoneTexte 99"/>
+            <p:cNvSpPr txBox="1"/>
+            <p:nvPr/>
+          </p:nvSpPr>
+          <p:spPr>
+            <a:xfrm>
+              <a:off x="4250588" y="301961"/>
+              <a:ext cx="7796269" cy="10156627"/>
+            </a:xfrm>
+            <a:prstGeom prst="rect">
+              <a:avLst/>
+            </a:prstGeom>
+            <a:noFill/>
+            <a:ln>
+              <a:solidFill>
+                <a:schemeClr val="tx1"/>
+              </a:solidFill>
+            </a:ln>
+          </p:spPr>
+          <p:txBody>
+            <a:bodyPr wrap="square" rtlCol="0">
+              <a:spAutoFit/>
+            </a:bodyPr>
+            <a:lstStyle/>
+            <a:p>
+              <a:r>
+                <a:rPr lang="fr-FR" sz="2000" b="1" dirty="0"/>
+                <a:t>Sélection sur épi (répété 100 fois pour chaque combinaison NEO x </a:t>
+              </a:r>
+              <a:r>
+                <a:rPr lang="fr-FR" sz="2000" b="1" dirty="0" err="1"/>
+                <a:t>nsel</a:t>
+              </a:r>
+              <a:r>
+                <a:rPr lang="fr-FR" sz="2000" b="1" dirty="0"/>
+                <a:t>)</a:t>
+              </a:r>
+            </a:p>
+            <a:p>
+              <a:endParaRPr lang="fr-FR" dirty="0"/>
+            </a:p>
+            <a:p>
+              <a:endParaRPr lang="fr-FR" dirty="0"/>
+            </a:p>
+            <a:p>
+              <a:endParaRPr lang="fr-FR" dirty="0"/>
+            </a:p>
+            <a:p>
+              <a:endParaRPr lang="fr-FR" dirty="0"/>
+            </a:p>
+            <a:p>
+              <a:endParaRPr lang="fr-FR" dirty="0"/>
+            </a:p>
+            <a:p>
+              <a:endParaRPr lang="fr-FR" dirty="0"/>
+            </a:p>
+            <a:p>
+              <a:endParaRPr lang="fr-FR" dirty="0"/>
+            </a:p>
+            <a:p>
+              <a:endParaRPr lang="fr-FR" dirty="0"/>
+            </a:p>
+            <a:p>
+              <a:endParaRPr lang="fr-FR" dirty="0"/>
+            </a:p>
+            <a:p>
+              <a:endParaRPr lang="fr-FR" dirty="0"/>
+            </a:p>
+            <a:p>
+              <a:endParaRPr lang="fr-FR" dirty="0"/>
+            </a:p>
+            <a:p>
+              <a:endParaRPr lang="fr-FR" dirty="0"/>
+            </a:p>
+            <a:p>
+              <a:endParaRPr lang="fr-FR" dirty="0"/>
+            </a:p>
+            <a:p>
+              <a:endParaRPr lang="fr-FR" dirty="0"/>
+            </a:p>
+            <a:p>
+              <a:endParaRPr lang="fr-FR" dirty="0"/>
+            </a:p>
+            <a:p>
+              <a:endParaRPr lang="fr-FR" dirty="0"/>
+            </a:p>
+            <a:p>
+              <a:endParaRPr lang="fr-FR" dirty="0"/>
+            </a:p>
+            <a:p>
+              <a:endParaRPr lang="fr-FR" dirty="0"/>
+            </a:p>
+            <a:p>
+              <a:endParaRPr lang="fr-FR" dirty="0"/>
+            </a:p>
+            <a:p>
+              <a:endParaRPr lang="fr-FR" dirty="0"/>
+            </a:p>
+            <a:p>
+              <a:endParaRPr lang="fr-FR" dirty="0"/>
+            </a:p>
+            <a:p>
+              <a:endParaRPr lang="fr-FR" dirty="0"/>
+            </a:p>
+            <a:p>
+              <a:endParaRPr lang="fr-FR" dirty="0"/>
+            </a:p>
+            <a:p>
+              <a:endParaRPr lang="fr-FR" dirty="0"/>
+            </a:p>
+            <a:p>
+              <a:endParaRPr lang="fr-FR" dirty="0"/>
+            </a:p>
+            <a:p>
+              <a:endParaRPr lang="fr-FR" dirty="0"/>
+            </a:p>
+            <a:p>
+              <a:endParaRPr lang="fr-FR" dirty="0"/>
+            </a:p>
+            <a:p>
+              <a:endParaRPr lang="fr-FR" dirty="0"/>
+            </a:p>
+            <a:p>
+              <a:endParaRPr lang="fr-FR" dirty="0"/>
+            </a:p>
+            <a:p>
+              <a:endParaRPr lang="fr-FR" dirty="0"/>
+            </a:p>
+            <a:p>
+              <a:endParaRPr lang="fr-FR" dirty="0" smtClean="0"/>
+            </a:p>
+            <a:p>
+              <a:endParaRPr lang="fr-FR" dirty="0"/>
+            </a:p>
+            <a:p>
+              <a:endParaRPr lang="fr-FR" dirty="0" smtClean="0"/>
+            </a:p>
+            <a:p>
+              <a:r>
+                <a:rPr lang="fr-FR" sz="2000" dirty="0" smtClean="0"/>
+                <a:t>La sélection sur épi se fait sur des moyennes de tailles de grains, le progrès est mesuré à partir de moyennes de tailles de grains</a:t>
+              </a:r>
+              <a:endParaRPr lang="fr-FR" sz="2000" dirty="0"/>
+            </a:p>
+          </p:txBody>
+        </p:sp>
+        <p:pic>
+          <p:nvPicPr>
+            <p:cNvPr id="34" name="Image 33"/>
+            <p:cNvPicPr>
+              <a:picLocks noChangeAspect="1"/>
+            </p:cNvPicPr>
+            <p:nvPr/>
+          </p:nvPicPr>
+          <p:blipFill>
+            <a:blip r:embed="rId2" cstate="print">
+              <a:extLst>
+                <a:ext uri="{28A0092B-C50C-407E-A947-70E740481C1C}">
+                  <a14:useLocalDpi xmlns:a14="http://schemas.microsoft.com/office/drawing/2010/main" val="0"/>
+                </a:ext>
+              </a:extLst>
+            </a:blip>
+            <a:stretch>
+              <a:fillRect/>
+            </a:stretch>
+          </p:blipFill>
+          <p:spPr>
+            <a:xfrm>
+              <a:off x="4972151" y="1409359"/>
+              <a:ext cx="626626" cy="469970"/>
+            </a:xfrm>
+            <a:prstGeom prst="rect">
+              <a:avLst/>
+            </a:prstGeom>
+          </p:spPr>
+        </p:pic>
+        <p:pic>
+          <p:nvPicPr>
+            <p:cNvPr id="35" name="Image 34"/>
+            <p:cNvPicPr>
+              <a:picLocks noChangeAspect="1"/>
+            </p:cNvPicPr>
+            <p:nvPr/>
+          </p:nvPicPr>
+          <p:blipFill>
+            <a:blip r:embed="rId2" cstate="print">
+              <a:extLst>
+                <a:ext uri="{28A0092B-C50C-407E-A947-70E740481C1C}">
+                  <a14:useLocalDpi xmlns:a14="http://schemas.microsoft.com/office/drawing/2010/main" val="0"/>
+                </a:ext>
+              </a:extLst>
+            </a:blip>
+            <a:stretch>
+              <a:fillRect/>
+            </a:stretch>
+          </p:blipFill>
+          <p:spPr>
+            <a:xfrm>
+              <a:off x="4972151" y="1879329"/>
+              <a:ext cx="626626" cy="469970"/>
+            </a:xfrm>
+            <a:prstGeom prst="rect">
+              <a:avLst/>
+            </a:prstGeom>
+          </p:spPr>
+        </p:pic>
+        <p:pic>
+          <p:nvPicPr>
+            <p:cNvPr id="36" name="Image 35"/>
+            <p:cNvPicPr>
+              <a:picLocks noChangeAspect="1"/>
+            </p:cNvPicPr>
+            <p:nvPr/>
+          </p:nvPicPr>
+          <p:blipFill>
+            <a:blip r:embed="rId2" cstate="print">
+              <a:extLst>
+                <a:ext uri="{28A0092B-C50C-407E-A947-70E740481C1C}">
+                  <a14:useLocalDpi xmlns:a14="http://schemas.microsoft.com/office/drawing/2010/main" val="0"/>
+                </a:ext>
+              </a:extLst>
+            </a:blip>
+            <a:stretch>
+              <a:fillRect/>
+            </a:stretch>
+          </p:blipFill>
+          <p:spPr>
+            <a:xfrm>
+              <a:off x="4953863" y="2584284"/>
+              <a:ext cx="626626" cy="469970"/>
+            </a:xfrm>
+            <a:prstGeom prst="rect">
+              <a:avLst/>
+            </a:prstGeom>
+          </p:spPr>
+        </p:pic>
+        <p:sp>
+          <p:nvSpPr>
+            <p:cNvPr id="37" name="ZoneTexte 36"/>
+            <p:cNvSpPr txBox="1"/>
+            <p:nvPr/>
+          </p:nvSpPr>
+          <p:spPr>
+            <a:xfrm rot="16200000">
+              <a:off x="5019530" y="2282126"/>
+              <a:ext cx="420624" cy="369332"/>
+            </a:xfrm>
+            <a:prstGeom prst="rect">
+              <a:avLst/>
+            </a:prstGeom>
+            <a:noFill/>
+          </p:spPr>
+          <p:txBody>
+            <a:bodyPr wrap="square" rtlCol="0">
+              <a:spAutoFit/>
+            </a:bodyPr>
+            <a:lstStyle/>
+            <a:p>
+              <a:pPr algn="ctr"/>
+              <a:r>
+                <a:rPr lang="fr-FR" b="1" dirty="0"/>
+                <a:t>…</a:t>
+              </a:r>
+            </a:p>
+          </p:txBody>
+        </p:sp>
+        <p:sp>
+          <p:nvSpPr>
+            <p:cNvPr id="38" name="Accolade fermante 37"/>
+            <p:cNvSpPr/>
+            <p:nvPr/>
+          </p:nvSpPr>
+          <p:spPr>
+            <a:xfrm>
+              <a:off x="5694668" y="1456976"/>
+              <a:ext cx="128016" cy="1481328"/>
+            </a:xfrm>
+            <a:prstGeom prst="rightBrace">
+              <a:avLst/>
+            </a:prstGeom>
+            <a:ln>
+              <a:solidFill>
+                <a:schemeClr val="tx1"/>
+              </a:solidFill>
+            </a:ln>
+          </p:spPr>
+          <p:style>
+            <a:lnRef idx="1">
+              <a:schemeClr val="accent1"/>
+            </a:lnRef>
+            <a:fillRef idx="0">
+              <a:schemeClr val="accent1"/>
+            </a:fillRef>
+            <a:effectRef idx="0">
+              <a:schemeClr val="accent1"/>
+            </a:effectRef>
+            <a:fontRef idx="minor">
+              <a:schemeClr val="tx1"/>
+            </a:fontRef>
+          </p:style>
+          <p:txBody>
+            <a:bodyPr rtlCol="0" anchor="ctr"/>
+            <a:lstStyle/>
+            <a:p>
+              <a:pPr algn="ctr"/>
+              <a:endParaRPr lang="fr-FR"/>
+            </a:p>
+          </p:txBody>
+        </p:sp>
+        <p:sp>
+          <p:nvSpPr>
+            <p:cNvPr id="40" name="ZoneTexte 39"/>
+            <p:cNvSpPr txBox="1"/>
+            <p:nvPr/>
+          </p:nvSpPr>
+          <p:spPr>
+            <a:xfrm>
+              <a:off x="4574387" y="1469489"/>
+              <a:ext cx="539496" cy="338554"/>
+            </a:xfrm>
+            <a:prstGeom prst="rect">
+              <a:avLst/>
+            </a:prstGeom>
+            <a:noFill/>
+          </p:spPr>
+          <p:txBody>
+            <a:bodyPr wrap="square" rtlCol="0">
+              <a:spAutoFit/>
+            </a:bodyPr>
+            <a:lstStyle/>
+            <a:p>
+              <a:r>
+                <a:rPr lang="fr-FR" sz="1600" b="1" dirty="0"/>
+                <a:t>G1</a:t>
+              </a:r>
+            </a:p>
+          </p:txBody>
+        </p:sp>
+        <p:sp>
+          <p:nvSpPr>
+            <p:cNvPr id="41" name="ZoneTexte 40"/>
+            <p:cNvSpPr txBox="1"/>
+            <p:nvPr/>
+          </p:nvSpPr>
+          <p:spPr>
+            <a:xfrm>
+              <a:off x="4574256" y="1939459"/>
+              <a:ext cx="539496" cy="338554"/>
+            </a:xfrm>
+            <a:prstGeom prst="rect">
+              <a:avLst/>
+            </a:prstGeom>
+            <a:noFill/>
+          </p:spPr>
+          <p:txBody>
+            <a:bodyPr wrap="square" rtlCol="0">
+              <a:spAutoFit/>
+            </a:bodyPr>
+            <a:lstStyle/>
+            <a:p>
+              <a:r>
+                <a:rPr lang="fr-FR" sz="1600" b="1" dirty="0"/>
+                <a:t>G2</a:t>
+              </a:r>
+            </a:p>
+          </p:txBody>
+        </p:sp>
+        <p:sp>
+          <p:nvSpPr>
+            <p:cNvPr id="42" name="ZoneTexte 41"/>
+            <p:cNvSpPr txBox="1"/>
+            <p:nvPr/>
+          </p:nvSpPr>
+          <p:spPr>
+            <a:xfrm>
+              <a:off x="4437490" y="2677105"/>
+              <a:ext cx="727293" cy="307777"/>
+            </a:xfrm>
+            <a:prstGeom prst="rect">
+              <a:avLst/>
+            </a:prstGeom>
+            <a:noFill/>
+          </p:spPr>
+          <p:txBody>
+            <a:bodyPr wrap="square" rtlCol="0">
+              <a:spAutoFit/>
+            </a:bodyPr>
+            <a:lstStyle/>
+            <a:p>
+              <a:r>
+                <a:rPr lang="fr-FR" sz="1400" b="1" dirty="0"/>
+                <a:t>G177</a:t>
+              </a:r>
+            </a:p>
+          </p:txBody>
+        </p:sp>
+        <p:sp>
+          <p:nvSpPr>
+            <p:cNvPr id="43" name="Rectangle 42"/>
+            <p:cNvSpPr/>
+            <p:nvPr/>
+          </p:nvSpPr>
+          <p:spPr>
+            <a:xfrm>
+              <a:off x="6102844" y="1277162"/>
+              <a:ext cx="1328357" cy="1840955"/>
+            </a:xfrm>
+            <a:prstGeom prst="rect">
+              <a:avLst/>
+            </a:prstGeom>
+            <a:solidFill>
+              <a:schemeClr val="accent6">
+                <a:lumMod val="40000"/>
+                <a:lumOff val="60000"/>
+              </a:schemeClr>
+            </a:solidFill>
+            <a:ln>
+              <a:solidFill>
+                <a:schemeClr val="accent6">
+                  <a:lumMod val="75000"/>
+                </a:schemeClr>
+              </a:solidFill>
+            </a:ln>
+          </p:spPr>
+          <p:style>
+            <a:lnRef idx="2">
+              <a:schemeClr val="accent1">
+                <a:shade val="50000"/>
+              </a:schemeClr>
+            </a:lnRef>
+            <a:fillRef idx="1">
+              <a:schemeClr val="accent1"/>
+            </a:fillRef>
+            <a:effectRef idx="0">
+              <a:schemeClr val="accent1"/>
+            </a:effectRef>
+            <a:fontRef idx="minor">
+              <a:schemeClr val="lt1"/>
+            </a:fontRef>
+          </p:style>
+          <p:txBody>
+            <a:bodyPr rot="0" spcFirstLastPara="0" vertOverflow="overflow" horzOverflow="overflow" vert="horz" wrap="square" lIns="91440" tIns="45720" rIns="91440" bIns="45720" numCol="1" spcCol="0" rtlCol="0" fromWordArt="0" anchor="ctr" anchorCtr="0" forceAA="0" compatLnSpc="1">
+              <a:prstTxWarp prst="textNoShape">
+                <a:avLst/>
+              </a:prstTxWarp>
+              <a:noAutofit/>
+            </a:bodyPr>
+            <a:lstStyle/>
+            <a:p>
+              <a:pPr algn="ctr"/>
+              <a:r>
+                <a:rPr lang="fr-FR" sz="1600" dirty="0">
+                  <a:solidFill>
+                    <a:schemeClr val="tx1"/>
+                  </a:solidFill>
+                </a:rPr>
+                <a:t>Moyenne de la taille des grains par </a:t>
+              </a:r>
+              <a:r>
+                <a:rPr lang="fr-FR" sz="1600" dirty="0">
+                  <a:solidFill>
+                    <a:schemeClr val="tx1"/>
+                  </a:solidFill>
+                </a:rPr>
+                <a:t>génotype</a:t>
+              </a:r>
+              <a:endParaRPr lang="fr-FR" sz="1600" dirty="0">
+                <a:solidFill>
+                  <a:schemeClr val="tx1"/>
+                </a:solidFill>
+              </a:endParaRPr>
+            </a:p>
+          </p:txBody>
+        </p:sp>
+        <p:cxnSp>
+          <p:nvCxnSpPr>
+            <p:cNvPr id="44" name="Connecteur droit avec flèche 43"/>
+            <p:cNvCxnSpPr>
+              <a:stCxn id="38" idx="1"/>
+              <a:endCxn id="43" idx="1"/>
+            </p:cNvCxnSpPr>
+            <p:nvPr/>
+          </p:nvCxnSpPr>
+          <p:spPr>
+            <a:xfrm>
+              <a:off x="5822684" y="2197640"/>
+              <a:ext cx="280160" cy="0"/>
+            </a:xfrm>
+            <a:prstGeom prst="straightConnector1">
+              <a:avLst/>
+            </a:prstGeom>
+            <a:ln w="28575">
+              <a:solidFill>
+                <a:schemeClr val="tx1"/>
+              </a:solidFill>
+              <a:tailEnd type="triangle"/>
+            </a:ln>
+          </p:spPr>
+          <p:style>
+            <a:lnRef idx="1">
+              <a:schemeClr val="accent1"/>
+            </a:lnRef>
+            <a:fillRef idx="0">
+              <a:schemeClr val="accent1"/>
+            </a:fillRef>
+            <a:effectRef idx="0">
+              <a:schemeClr val="accent1"/>
+            </a:effectRef>
+            <a:fontRef idx="minor">
+              <a:schemeClr val="tx1"/>
+            </a:fontRef>
+          </p:style>
+        </p:cxnSp>
+        <p:cxnSp>
+          <p:nvCxnSpPr>
+            <p:cNvPr id="45" name="Connecteur droit avec flèche 44"/>
+            <p:cNvCxnSpPr>
+              <a:stCxn id="43" idx="3"/>
+              <a:endCxn id="47" idx="1"/>
+            </p:cNvCxnSpPr>
+            <p:nvPr/>
+          </p:nvCxnSpPr>
+          <p:spPr>
+            <a:xfrm flipV="1">
+              <a:off x="7431201" y="2197639"/>
+              <a:ext cx="1305283" cy="1"/>
+            </a:xfrm>
+            <a:prstGeom prst="straightConnector1">
+              <a:avLst/>
+            </a:prstGeom>
+            <a:ln w="28575">
+              <a:solidFill>
+                <a:schemeClr val="tx1"/>
+              </a:solidFill>
+              <a:tailEnd type="triangle"/>
+            </a:ln>
+          </p:spPr>
+          <p:style>
+            <a:lnRef idx="1">
+              <a:schemeClr val="accent1"/>
+            </a:lnRef>
+            <a:fillRef idx="0">
+              <a:schemeClr val="accent1"/>
+            </a:fillRef>
+            <a:effectRef idx="0">
+              <a:schemeClr val="accent1"/>
+            </a:effectRef>
+            <a:fontRef idx="minor">
+              <a:schemeClr val="tx1"/>
+            </a:fontRef>
+          </p:style>
+        </p:cxnSp>
+        <p:sp>
+          <p:nvSpPr>
+            <p:cNvPr id="46" name="ZoneTexte 45"/>
+            <p:cNvSpPr txBox="1"/>
+            <p:nvPr/>
+          </p:nvSpPr>
+          <p:spPr>
+            <a:xfrm>
+              <a:off x="7369474" y="1469082"/>
+              <a:ext cx="1434687" cy="738664"/>
+            </a:xfrm>
+            <a:prstGeom prst="rect">
+              <a:avLst/>
+            </a:prstGeom>
+            <a:noFill/>
+          </p:spPr>
+          <p:txBody>
+            <a:bodyPr wrap="square" rtlCol="0">
+              <a:spAutoFit/>
+            </a:bodyPr>
+            <a:lstStyle/>
+            <a:p>
+              <a:pPr algn="ctr"/>
+              <a:r>
+                <a:rPr lang="fr-FR" sz="1400" dirty="0"/>
+                <a:t>Echantillonnage </a:t>
+              </a:r>
+              <a:r>
+                <a:rPr lang="fr-FR" sz="1400" b="1" dirty="0"/>
+                <a:t>aléatoire</a:t>
+              </a:r>
+              <a:r>
+                <a:rPr lang="fr-FR" sz="1400" dirty="0"/>
+                <a:t> </a:t>
+              </a:r>
+              <a:r>
+                <a:rPr lang="fr-FR" sz="1400" dirty="0"/>
+                <a:t>de NEO épis</a:t>
+              </a:r>
+            </a:p>
+          </p:txBody>
+        </p:sp>
+        <p:sp>
+          <p:nvSpPr>
+            <p:cNvPr id="47" name="Rectangle 46"/>
+            <p:cNvSpPr/>
+            <p:nvPr/>
+          </p:nvSpPr>
+          <p:spPr>
+            <a:xfrm>
+              <a:off x="8736484" y="1538680"/>
+              <a:ext cx="1328357" cy="1317917"/>
+            </a:xfrm>
+            <a:prstGeom prst="rect">
+              <a:avLst/>
+            </a:prstGeom>
+            <a:solidFill>
+              <a:schemeClr val="accent6">
+                <a:lumMod val="40000"/>
+                <a:lumOff val="60000"/>
+              </a:schemeClr>
+            </a:solidFill>
+            <a:ln>
+              <a:solidFill>
+                <a:schemeClr val="accent6">
+                  <a:lumMod val="75000"/>
+                </a:schemeClr>
+              </a:solidFill>
+            </a:ln>
+          </p:spPr>
+          <p:style>
+            <a:lnRef idx="2">
+              <a:schemeClr val="accent1">
+                <a:shade val="50000"/>
+              </a:schemeClr>
+            </a:lnRef>
+            <a:fillRef idx="1">
+              <a:schemeClr val="accent1"/>
+            </a:fillRef>
+            <a:effectRef idx="0">
+              <a:schemeClr val="accent1"/>
+            </a:effectRef>
+            <a:fontRef idx="minor">
+              <a:schemeClr val="lt1"/>
+            </a:fontRef>
+          </p:style>
+          <p:txBody>
+            <a:bodyPr rot="0" spcFirstLastPara="0" vertOverflow="overflow" horzOverflow="overflow" vert="horz" wrap="square" lIns="91440" tIns="45720" rIns="91440" bIns="45720" numCol="1" spcCol="0" rtlCol="0" fromWordArt="0" anchor="ctr" anchorCtr="0" forceAA="0" compatLnSpc="1">
+              <a:prstTxWarp prst="textNoShape">
+                <a:avLst/>
+              </a:prstTxWarp>
+              <a:noAutofit/>
+            </a:bodyPr>
+            <a:lstStyle/>
+            <a:p>
+              <a:pPr algn="ctr"/>
+              <a:r>
+                <a:rPr lang="fr-FR" sz="1600" dirty="0">
+                  <a:solidFill>
+                    <a:schemeClr val="tx1"/>
+                  </a:solidFill>
+                </a:rPr>
+                <a:t>Génotypes </a:t>
+              </a:r>
+              <a:r>
+                <a:rPr lang="fr-FR" sz="1600" dirty="0">
+                  <a:solidFill>
+                    <a:schemeClr val="tx1"/>
+                  </a:solidFill>
+                </a:rPr>
+                <a:t>observés</a:t>
+              </a:r>
+            </a:p>
+          </p:txBody>
+        </p:sp>
+        <p:sp>
+          <p:nvSpPr>
+            <p:cNvPr id="57" name="Rectangle 56"/>
+            <p:cNvSpPr/>
+            <p:nvPr/>
+          </p:nvSpPr>
+          <p:spPr>
+            <a:xfrm>
+              <a:off x="8194606" y="3305066"/>
+              <a:ext cx="1328357" cy="670158"/>
+            </a:xfrm>
+            <a:prstGeom prst="rect">
+              <a:avLst/>
+            </a:prstGeom>
+            <a:solidFill>
+              <a:schemeClr val="accent6">
+                <a:lumMod val="40000"/>
+                <a:lumOff val="60000"/>
+              </a:schemeClr>
+            </a:solidFill>
+            <a:ln>
+              <a:solidFill>
+                <a:schemeClr val="accent6">
+                  <a:lumMod val="75000"/>
+                </a:schemeClr>
+              </a:solidFill>
+            </a:ln>
+          </p:spPr>
+          <p:style>
+            <a:lnRef idx="2">
+              <a:schemeClr val="accent1">
+                <a:shade val="50000"/>
+              </a:schemeClr>
+            </a:lnRef>
+            <a:fillRef idx="1">
+              <a:schemeClr val="accent1"/>
+            </a:fillRef>
+            <a:effectRef idx="0">
+              <a:schemeClr val="accent1"/>
+            </a:effectRef>
+            <a:fontRef idx="minor">
+              <a:schemeClr val="lt1"/>
+            </a:fontRef>
+          </p:style>
+          <p:txBody>
+            <a:bodyPr rot="0" spcFirstLastPara="0" vertOverflow="overflow" horzOverflow="overflow" vert="horz" wrap="square" lIns="91440" tIns="45720" rIns="91440" bIns="45720" numCol="1" spcCol="0" rtlCol="0" fromWordArt="0" anchor="ctr" anchorCtr="0" forceAA="0" compatLnSpc="1">
+              <a:prstTxWarp prst="textNoShape">
+                <a:avLst/>
+              </a:prstTxWarp>
+              <a:noAutofit/>
+            </a:bodyPr>
+            <a:lstStyle/>
+            <a:p>
+              <a:pPr algn="ctr"/>
+              <a:r>
+                <a:rPr lang="fr-FR" sz="1600" dirty="0">
+                  <a:solidFill>
+                    <a:schemeClr val="tx1"/>
+                  </a:solidFill>
+                </a:rPr>
+                <a:t>Génotypes sélectionnés</a:t>
+              </a:r>
+              <a:endParaRPr lang="fr-FR" sz="1600" dirty="0">
+                <a:solidFill>
+                  <a:schemeClr val="tx1"/>
+                </a:solidFill>
+              </a:endParaRPr>
+            </a:p>
+          </p:txBody>
+        </p:sp>
+        <p:cxnSp>
+          <p:nvCxnSpPr>
+            <p:cNvPr id="58" name="Connecteur en angle 57"/>
+            <p:cNvCxnSpPr>
+              <a:stCxn id="82" idx="1"/>
+              <a:endCxn id="57" idx="0"/>
+            </p:cNvCxnSpPr>
+            <p:nvPr/>
+          </p:nvCxnSpPr>
+          <p:spPr>
+            <a:xfrm flipH="1">
+              <a:off x="8858785" y="1939459"/>
+              <a:ext cx="1438284" cy="1365607"/>
+            </a:xfrm>
+            <a:prstGeom prst="bentConnector4">
+              <a:avLst>
+                <a:gd name="adj1" fmla="val -15894"/>
+                <a:gd name="adj2" fmla="val 83206"/>
+              </a:avLst>
+            </a:prstGeom>
+            <a:ln w="28575">
+              <a:solidFill>
+                <a:schemeClr val="tx1"/>
+              </a:solidFill>
+              <a:tailEnd type="triangle"/>
+            </a:ln>
+          </p:spPr>
+          <p:style>
+            <a:lnRef idx="1">
+              <a:schemeClr val="accent1"/>
+            </a:lnRef>
+            <a:fillRef idx="0">
+              <a:schemeClr val="accent1"/>
+            </a:fillRef>
+            <a:effectRef idx="0">
+              <a:schemeClr val="accent1"/>
+            </a:effectRef>
+            <a:fontRef idx="minor">
+              <a:schemeClr val="tx1"/>
+            </a:fontRef>
+          </p:style>
+        </p:cxnSp>
+        <p:sp>
+          <p:nvSpPr>
+            <p:cNvPr id="61" name="ZoneTexte 60"/>
+            <p:cNvSpPr txBox="1"/>
+            <p:nvPr/>
+          </p:nvSpPr>
+          <p:spPr>
+            <a:xfrm>
+              <a:off x="10528552" y="1999508"/>
+              <a:ext cx="1186322" cy="1169551"/>
+            </a:xfrm>
+            <a:prstGeom prst="rect">
+              <a:avLst/>
+            </a:prstGeom>
+            <a:noFill/>
+          </p:spPr>
+          <p:txBody>
+            <a:bodyPr wrap="square" rtlCol="0">
+              <a:spAutoFit/>
+            </a:bodyPr>
+            <a:lstStyle/>
+            <a:p>
+              <a:r>
+                <a:rPr lang="fr-FR" sz="1400" dirty="0" err="1"/>
+                <a:t>n</a:t>
+              </a:r>
+              <a:r>
+                <a:rPr lang="fr-FR" sz="1400" dirty="0" err="1"/>
+                <a:t>sel</a:t>
+              </a:r>
+              <a:r>
+                <a:rPr lang="fr-FR" sz="1400" dirty="0"/>
+                <a:t>/NGE génotypes avec les plus grandes moyennes</a:t>
+              </a:r>
+              <a:endParaRPr lang="fr-FR" sz="1400" dirty="0"/>
+            </a:p>
+          </p:txBody>
+        </p:sp>
+        <p:sp>
+          <p:nvSpPr>
+            <p:cNvPr id="63" name="Rectangle 62"/>
+            <p:cNvSpPr/>
+            <p:nvPr/>
+          </p:nvSpPr>
+          <p:spPr>
+            <a:xfrm>
+              <a:off x="6571250" y="3979384"/>
+              <a:ext cx="1348244" cy="1783080"/>
+            </a:xfrm>
+            <a:prstGeom prst="rect">
+              <a:avLst/>
+            </a:prstGeom>
+            <a:ln>
+              <a:noFill/>
+            </a:ln>
+          </p:spPr>
+          <p:style>
+            <a:lnRef idx="2">
+              <a:schemeClr val="accent1">
+                <a:shade val="50000"/>
+              </a:schemeClr>
+            </a:lnRef>
+            <a:fillRef idx="1">
+              <a:schemeClr val="accent1"/>
+            </a:fillRef>
+            <a:effectRef idx="0">
+              <a:schemeClr val="accent1"/>
+            </a:effectRef>
+            <a:fontRef idx="minor">
+              <a:schemeClr val="lt1"/>
+            </a:fontRef>
+          </p:style>
+          <p:txBody>
+            <a:bodyPr rot="0" spcFirstLastPara="0" vertOverflow="overflow" horzOverflow="overflow" vert="horz" wrap="square" lIns="91440" tIns="45720" rIns="91440" bIns="45720" numCol="1" spcCol="0" rtlCol="0" fromWordArt="0" anchor="ctr" anchorCtr="0" forceAA="0" compatLnSpc="1">
+              <a:prstTxWarp prst="textNoShape">
+                <a:avLst/>
+              </a:prstTxWarp>
+              <a:noAutofit/>
+            </a:bodyPr>
+            <a:lstStyle/>
+            <a:p>
+              <a:pPr algn="ctr"/>
+              <a:r>
+                <a:rPr lang="fr-FR" dirty="0"/>
+                <a:t>Données des bacs</a:t>
+              </a:r>
+            </a:p>
+          </p:txBody>
+        </p:sp>
+        <p:sp>
+          <p:nvSpPr>
+            <p:cNvPr id="66" name="Rectangle 65"/>
+            <p:cNvSpPr/>
+            <p:nvPr/>
+          </p:nvSpPr>
+          <p:spPr>
+            <a:xfrm>
+              <a:off x="9428996" y="4110154"/>
+              <a:ext cx="1348244" cy="826008"/>
+            </a:xfrm>
+            <a:prstGeom prst="rect">
+              <a:avLst/>
+            </a:prstGeom>
+            <a:solidFill>
+              <a:schemeClr val="accent6"/>
+            </a:solidFill>
+            <a:ln>
+              <a:noFill/>
+            </a:ln>
+          </p:spPr>
+          <p:style>
+            <a:lnRef idx="2">
+              <a:schemeClr val="accent1">
+                <a:shade val="50000"/>
+              </a:schemeClr>
+            </a:lnRef>
+            <a:fillRef idx="1">
+              <a:schemeClr val="accent1"/>
+            </a:fillRef>
+            <a:effectRef idx="0">
+              <a:schemeClr val="accent1"/>
+            </a:effectRef>
+            <a:fontRef idx="minor">
+              <a:schemeClr val="lt1"/>
+            </a:fontRef>
+          </p:style>
+          <p:txBody>
+            <a:bodyPr rot="0" spcFirstLastPara="0" vertOverflow="overflow" horzOverflow="overflow" vert="horz" wrap="square" lIns="91440" tIns="45720" rIns="91440" bIns="45720" numCol="1" spcCol="0" rtlCol="0" fromWordArt="0" anchor="ctr" anchorCtr="0" forceAA="0" compatLnSpc="1">
+              <a:prstTxWarp prst="textNoShape">
+                <a:avLst/>
+              </a:prstTxWarp>
+              <a:noAutofit/>
+            </a:bodyPr>
+            <a:lstStyle/>
+            <a:p>
+              <a:pPr algn="ctr"/>
+              <a:r>
+                <a:rPr lang="fr-FR" sz="1600" dirty="0"/>
+                <a:t>Population sélectionnée sur </a:t>
+              </a:r>
+              <a:r>
+                <a:rPr lang="fr-FR" sz="1600" dirty="0"/>
+                <a:t>épi</a:t>
+              </a:r>
+              <a:endParaRPr lang="fr-FR" sz="1600" dirty="0"/>
+            </a:p>
+          </p:txBody>
+        </p:sp>
+        <p:sp>
+          <p:nvSpPr>
+            <p:cNvPr id="80" name="ZoneTexte 79"/>
+            <p:cNvSpPr txBox="1"/>
+            <p:nvPr/>
+          </p:nvSpPr>
+          <p:spPr>
+            <a:xfrm>
+              <a:off x="4332147" y="2973957"/>
+              <a:ext cx="1796141" cy="1169551"/>
+            </a:xfrm>
+            <a:prstGeom prst="rect">
+              <a:avLst/>
+            </a:prstGeom>
+            <a:noFill/>
+          </p:spPr>
+          <p:txBody>
+            <a:bodyPr wrap="square" rtlCol="0">
+              <a:spAutoFit/>
+            </a:bodyPr>
+            <a:lstStyle/>
+            <a:p>
+              <a:pPr algn="ctr"/>
+              <a:r>
+                <a:rPr lang="fr-FR" sz="1400" dirty="0"/>
+                <a:t>Chaque </a:t>
+              </a:r>
+              <a:r>
+                <a:rPr lang="fr-FR" sz="1400" dirty="0"/>
+                <a:t>lot de 12 grain est considéré comme 1 épi (il y a donc 1 épi par génotype</a:t>
+              </a:r>
+              <a:r>
+                <a:rPr lang="fr-FR" sz="1400" dirty="0"/>
+                <a:t>)</a:t>
+              </a:r>
+              <a:endParaRPr lang="fr-FR" sz="1400" dirty="0"/>
+            </a:p>
+          </p:txBody>
+        </p:sp>
+        <p:sp>
+          <p:nvSpPr>
+            <p:cNvPr id="82" name="Accolade ouvrante 81"/>
+            <p:cNvSpPr/>
+            <p:nvPr/>
+          </p:nvSpPr>
+          <p:spPr>
+            <a:xfrm flipH="1">
+              <a:off x="10064840" y="1555050"/>
+              <a:ext cx="232229" cy="768818"/>
+            </a:xfrm>
+            <a:prstGeom prst="leftBrace">
+              <a:avLst/>
+            </a:prstGeom>
+            <a:ln>
+              <a:solidFill>
+                <a:schemeClr val="tx1"/>
+              </a:solidFill>
+            </a:ln>
+          </p:spPr>
+          <p:style>
+            <a:lnRef idx="1">
+              <a:schemeClr val="accent1"/>
+            </a:lnRef>
+            <a:fillRef idx="0">
+              <a:schemeClr val="accent1"/>
+            </a:fillRef>
+            <a:effectRef idx="0">
+              <a:schemeClr val="accent1"/>
+            </a:effectRef>
+            <a:fontRef idx="minor">
+              <a:schemeClr val="tx1"/>
+            </a:fontRef>
+          </p:style>
+          <p:txBody>
+            <a:bodyPr rtlCol="0" anchor="ctr"/>
+            <a:lstStyle/>
+            <a:p>
+              <a:pPr algn="ctr"/>
+              <a:endParaRPr lang="fr-FR"/>
+            </a:p>
+          </p:txBody>
+        </p:sp>
+        <p:sp>
+          <p:nvSpPr>
+            <p:cNvPr id="87" name="Accolade ouvrante 86"/>
+            <p:cNvSpPr/>
+            <p:nvPr/>
+          </p:nvSpPr>
+          <p:spPr>
+            <a:xfrm flipH="1">
+              <a:off x="7919493" y="3989620"/>
+              <a:ext cx="232229" cy="946541"/>
+            </a:xfrm>
+            <a:prstGeom prst="leftBrace">
+              <a:avLst/>
+            </a:prstGeom>
+            <a:ln>
+              <a:solidFill>
+                <a:schemeClr val="tx1"/>
+              </a:solidFill>
+            </a:ln>
+          </p:spPr>
+          <p:style>
+            <a:lnRef idx="1">
+              <a:schemeClr val="accent1"/>
+            </a:lnRef>
+            <a:fillRef idx="0">
+              <a:schemeClr val="accent1"/>
+            </a:fillRef>
+            <a:effectRef idx="0">
+              <a:schemeClr val="accent1"/>
+            </a:effectRef>
+            <a:fontRef idx="minor">
+              <a:schemeClr val="tx1"/>
+            </a:fontRef>
+          </p:style>
+          <p:txBody>
+            <a:bodyPr rtlCol="0" anchor="ctr"/>
+            <a:lstStyle/>
+            <a:p>
+              <a:pPr algn="ctr"/>
+              <a:endParaRPr lang="fr-FR"/>
+            </a:p>
+          </p:txBody>
+        </p:sp>
+        <p:sp>
+          <p:nvSpPr>
+            <p:cNvPr id="94" name="Arc 93"/>
+            <p:cNvSpPr/>
+            <p:nvPr/>
+          </p:nvSpPr>
+          <p:spPr>
+            <a:xfrm>
+              <a:off x="8194606" y="3944425"/>
+              <a:ext cx="1234390" cy="1299574"/>
+            </a:xfrm>
+            <a:prstGeom prst="arc">
+              <a:avLst>
+                <a:gd name="adj1" fmla="val 11463237"/>
+                <a:gd name="adj2" fmla="val 19313475"/>
+              </a:avLst>
+            </a:prstGeom>
+            <a:ln w="28575">
+              <a:solidFill>
+                <a:schemeClr val="tx1"/>
+              </a:solidFill>
+            </a:ln>
+          </p:spPr>
+          <p:style>
+            <a:lnRef idx="1">
+              <a:schemeClr val="accent1"/>
+            </a:lnRef>
+            <a:fillRef idx="0">
+              <a:schemeClr val="accent1"/>
+            </a:fillRef>
+            <a:effectRef idx="0">
+              <a:schemeClr val="accent1"/>
+            </a:effectRef>
+            <a:fontRef idx="minor">
+              <a:schemeClr val="tx1"/>
+            </a:fontRef>
+          </p:style>
+          <p:txBody>
+            <a:bodyPr rtlCol="0" anchor="ctr"/>
+            <a:lstStyle/>
+            <a:p>
+              <a:pPr algn="ctr"/>
+              <a:endParaRPr lang="fr-FR"/>
+            </a:p>
+          </p:txBody>
+        </p:sp>
+        <p:cxnSp>
+          <p:nvCxnSpPr>
+            <p:cNvPr id="96" name="Connecteur droit avec flèche 95"/>
+            <p:cNvCxnSpPr>
+              <a:stCxn id="94" idx="2"/>
+              <a:endCxn id="66" idx="1"/>
+            </p:cNvCxnSpPr>
+            <p:nvPr/>
+          </p:nvCxnSpPr>
+          <p:spPr>
+            <a:xfrm>
+              <a:off x="9306741" y="4206007"/>
+              <a:ext cx="122255" cy="317151"/>
+            </a:xfrm>
+            <a:prstGeom prst="straightConnector1">
+              <a:avLst/>
+            </a:prstGeom>
+            <a:ln w="28575">
+              <a:solidFill>
+                <a:schemeClr val="tx1"/>
+              </a:solidFill>
+              <a:tailEnd type="triangle"/>
+            </a:ln>
+          </p:spPr>
+          <p:style>
+            <a:lnRef idx="1">
+              <a:schemeClr val="accent1"/>
+            </a:lnRef>
+            <a:fillRef idx="0">
+              <a:schemeClr val="accent1"/>
+            </a:fillRef>
+            <a:effectRef idx="0">
+              <a:schemeClr val="accent1"/>
+            </a:effectRef>
+            <a:fontRef idx="minor">
+              <a:schemeClr val="tx1"/>
+            </a:fontRef>
+          </p:style>
+        </p:cxnSp>
+        <p:sp>
+          <p:nvSpPr>
+            <p:cNvPr id="102" name="ZoneTexte 101"/>
+            <p:cNvSpPr txBox="1"/>
+            <p:nvPr/>
+          </p:nvSpPr>
+          <p:spPr>
+            <a:xfrm>
+              <a:off x="4647644" y="883037"/>
+              <a:ext cx="1292126" cy="523220"/>
+            </a:xfrm>
+            <a:prstGeom prst="rect">
+              <a:avLst/>
+            </a:prstGeom>
+            <a:noFill/>
+          </p:spPr>
+          <p:txBody>
+            <a:bodyPr wrap="square" rtlCol="0">
+              <a:spAutoFit/>
+            </a:bodyPr>
+            <a:lstStyle/>
+            <a:p>
+              <a:pPr algn="ctr"/>
+              <a:r>
+                <a:rPr lang="fr-FR" sz="1400" dirty="0"/>
+                <a:t>12 grains par </a:t>
+              </a:r>
+              <a:r>
+                <a:rPr lang="fr-FR" sz="1400" dirty="0"/>
+                <a:t>génotype</a:t>
+              </a:r>
+              <a:endParaRPr lang="fr-FR" dirty="0"/>
+            </a:p>
+          </p:txBody>
+        </p:sp>
+        <p:grpSp>
+          <p:nvGrpSpPr>
+            <p:cNvPr id="108" name="Groupe 107"/>
+            <p:cNvGrpSpPr/>
+            <p:nvPr/>
+          </p:nvGrpSpPr>
+          <p:grpSpPr>
+            <a:xfrm>
+              <a:off x="5045176" y="6623731"/>
+              <a:ext cx="1348245" cy="2600912"/>
+              <a:chOff x="5020546" y="7175665"/>
+              <a:chExt cx="1348245" cy="2600912"/>
+            </a:xfrm>
+          </p:grpSpPr>
+          <p:sp>
+            <p:nvSpPr>
+              <p:cNvPr id="104" name="Rectangle 103"/>
+              <p:cNvSpPr/>
+              <p:nvPr/>
+            </p:nvSpPr>
+            <p:spPr>
+              <a:xfrm>
+                <a:off x="5020547" y="7175665"/>
+                <a:ext cx="1348244" cy="1783080"/>
+              </a:xfrm>
+              <a:prstGeom prst="rect">
+                <a:avLst/>
+              </a:prstGeom>
+              <a:ln>
+                <a:noFill/>
+              </a:ln>
+            </p:spPr>
+            <p:style>
+              <a:lnRef idx="2">
+                <a:schemeClr val="accent1">
+                  <a:shade val="50000"/>
+                </a:schemeClr>
+              </a:lnRef>
+              <a:fillRef idx="1">
+                <a:schemeClr val="accent1"/>
+              </a:fillRef>
+              <a:effectRef idx="0">
+                <a:schemeClr val="accent1"/>
+              </a:effectRef>
+              <a:fontRef idx="minor">
+                <a:schemeClr val="lt1"/>
+              </a:fontRef>
+            </p:style>
+            <p:txBody>
+              <a:bodyPr rot="0" spcFirstLastPara="0" vertOverflow="overflow" horzOverflow="overflow" vert="horz" wrap="square" lIns="91440" tIns="45720" rIns="91440" bIns="45720" numCol="1" spcCol="0" rtlCol="0" fromWordArt="0" anchor="ctr" anchorCtr="0" forceAA="0" compatLnSpc="1">
+                <a:prstTxWarp prst="textNoShape">
+                  <a:avLst/>
+                </a:prstTxWarp>
+                <a:noAutofit/>
+              </a:bodyPr>
+              <a:lstStyle/>
+              <a:p>
+                <a:pPr algn="ctr"/>
+                <a:r>
+                  <a:rPr lang="fr-FR" dirty="0"/>
+                  <a:t>Données des bacs</a:t>
+                </a:r>
+              </a:p>
+            </p:txBody>
+          </p:sp>
+          <p:sp>
+            <p:nvSpPr>
+              <p:cNvPr id="106" name="Rectangle 105"/>
+              <p:cNvSpPr/>
+              <p:nvPr/>
+            </p:nvSpPr>
+            <p:spPr>
+              <a:xfrm>
+                <a:off x="5020546" y="8950569"/>
+                <a:ext cx="1343179" cy="826008"/>
+              </a:xfrm>
+              <a:prstGeom prst="rect">
+                <a:avLst/>
+              </a:prstGeom>
+              <a:solidFill>
+                <a:schemeClr val="accent6"/>
+              </a:solidFill>
+              <a:ln>
+                <a:noFill/>
+              </a:ln>
+            </p:spPr>
+            <p:style>
+              <a:lnRef idx="2">
+                <a:schemeClr val="accent1">
+                  <a:shade val="50000"/>
+                </a:schemeClr>
+              </a:lnRef>
+              <a:fillRef idx="1">
+                <a:schemeClr val="accent1"/>
+              </a:fillRef>
+              <a:effectRef idx="0">
+                <a:schemeClr val="accent1"/>
+              </a:effectRef>
+              <a:fontRef idx="minor">
+                <a:schemeClr val="lt1"/>
+              </a:fontRef>
+            </p:style>
+            <p:txBody>
+              <a:bodyPr rot="0" spcFirstLastPara="0" vertOverflow="overflow" horzOverflow="overflow" vert="horz" wrap="square" lIns="91440" tIns="45720" rIns="91440" bIns="45720" numCol="1" spcCol="0" rtlCol="0" fromWordArt="0" anchor="ctr" anchorCtr="0" forceAA="0" compatLnSpc="1">
+                <a:prstTxWarp prst="textNoShape">
+                  <a:avLst/>
+                </a:prstTxWarp>
+                <a:noAutofit/>
+              </a:bodyPr>
+              <a:lstStyle/>
+              <a:p>
+                <a:pPr algn="ctr"/>
+                <a:r>
+                  <a:rPr lang="fr-FR" sz="1600" dirty="0"/>
+                  <a:t>Population sélectionnée sur </a:t>
+                </a:r>
+                <a:r>
+                  <a:rPr lang="fr-FR" sz="1600" dirty="0"/>
+                  <a:t>épi</a:t>
+                </a:r>
+                <a:endParaRPr lang="fr-FR" sz="1600" dirty="0"/>
+              </a:p>
+            </p:txBody>
+          </p:sp>
+        </p:grpSp>
+        <mc:AlternateContent xmlns:mc="http://schemas.openxmlformats.org/markup-compatibility/2006">
+          <mc:Choice xmlns:a14="http://schemas.microsoft.com/office/drawing/2010/main" Requires="a14">
+            <p:sp>
+              <p:nvSpPr>
+                <p:cNvPr id="107" name="Rectangle 106"/>
+                <p:cNvSpPr/>
+                <p:nvPr/>
+              </p:nvSpPr>
+              <p:spPr>
+                <a:xfrm>
+                  <a:off x="6767374" y="7327183"/>
+                  <a:ext cx="5245154" cy="491417"/>
+                </a:xfrm>
+                <a:prstGeom prst="rect">
+                  <a:avLst/>
+                </a:prstGeom>
+              </p:spPr>
+              <p:txBody>
+                <a:bodyPr wrap="none">
+                  <a:spAutoFit/>
+                </a:bodyPr>
+                <a:lstStyle/>
+                <a:p>
+                  <a:pPr/>
+                  <a14:m>
+                    <m:oMathPara xmlns:m="http://schemas.openxmlformats.org/officeDocument/2006/math">
+                      <m:oMathParaPr>
+                        <m:jc m:val="centerGroup"/>
+                      </m:oMathParaPr>
+                      <m:oMath xmlns:m="http://schemas.openxmlformats.org/officeDocument/2006/math">
+                        <m:sSub>
+                          <m:sSubPr>
+                            <m:ctrlPr>
+                              <a:rPr lang="fr-FR" sz="2400" i="1">
+                                <a:latin typeface="Cambria Math" panose="02040503050406030204" pitchFamily="18" charset="0"/>
+                              </a:rPr>
+                            </m:ctrlPr>
+                          </m:sSubPr>
+                          <m:e>
+                            <m:r>
+                              <a:rPr lang="fr-FR" sz="2400" i="1">
+                                <a:latin typeface="Cambria Math" panose="02040503050406030204" pitchFamily="18" charset="0"/>
+                              </a:rPr>
+                              <m:t>𝑌</m:t>
+                            </m:r>
+                          </m:e>
+                          <m:sub>
+                            <m:r>
+                              <a:rPr lang="fr-FR" sz="2400" i="1">
+                                <a:latin typeface="Cambria Math" panose="02040503050406030204" pitchFamily="18" charset="0"/>
+                              </a:rPr>
+                              <m:t>𝑖𝑗𝑘</m:t>
+                            </m:r>
+                          </m:sub>
+                        </m:sSub>
+                        <m:r>
+                          <a:rPr lang="fr-FR" sz="2400">
+                            <a:latin typeface="Cambria Math" panose="02040503050406030204" pitchFamily="18" charset="0"/>
+                          </a:rPr>
+                          <m:t>=µ+</m:t>
+                        </m:r>
+                        <m:r>
+                          <a:rPr lang="fr-FR" sz="2400" i="1">
+                            <a:latin typeface="Cambria Math" panose="02040503050406030204" pitchFamily="18" charset="0"/>
+                          </a:rPr>
+                          <m:t>𝐵𝐴</m:t>
+                        </m:r>
+                        <m:sSub>
+                          <m:sSubPr>
+                            <m:ctrlPr>
+                              <a:rPr lang="fr-FR" sz="2400" i="1">
+                                <a:latin typeface="Cambria Math" panose="02040503050406030204" pitchFamily="18" charset="0"/>
+                              </a:rPr>
+                            </m:ctrlPr>
+                          </m:sSubPr>
+                          <m:e>
+                            <m:r>
+                              <a:rPr lang="fr-FR" sz="2400" i="1">
+                                <a:latin typeface="Cambria Math" panose="02040503050406030204" pitchFamily="18" charset="0"/>
+                              </a:rPr>
+                              <m:t>𝐶</m:t>
+                            </m:r>
+                          </m:e>
+                          <m:sub>
+                            <m:r>
+                              <a:rPr lang="fr-FR" sz="2400" i="1">
+                                <a:latin typeface="Cambria Math" panose="02040503050406030204" pitchFamily="18" charset="0"/>
+                              </a:rPr>
+                              <m:t>𝑖</m:t>
+                            </m:r>
+                          </m:sub>
+                        </m:sSub>
+                        <m:r>
+                          <a:rPr lang="fr-FR" sz="2400">
+                            <a:latin typeface="Cambria Math" panose="02040503050406030204" pitchFamily="18" charset="0"/>
+                          </a:rPr>
+                          <m:t>+</m:t>
+                        </m:r>
+                        <m:r>
+                          <a:rPr lang="fr-FR" sz="2400" i="1">
+                            <a:latin typeface="Cambria Math" panose="02040503050406030204" pitchFamily="18" charset="0"/>
+                          </a:rPr>
+                          <m:t>𝑆𝐸𝐿𝐸𝐶𝑇𝐼𝑂</m:t>
+                        </m:r>
+                        <m:sSub>
+                          <m:sSubPr>
+                            <m:ctrlPr>
+                              <a:rPr lang="fr-FR" sz="2400" i="1">
+                                <a:latin typeface="Cambria Math" panose="02040503050406030204" pitchFamily="18" charset="0"/>
+                              </a:rPr>
+                            </m:ctrlPr>
+                          </m:sSubPr>
+                          <m:e>
+                            <m:r>
+                              <a:rPr lang="fr-FR" sz="2400" i="1">
+                                <a:latin typeface="Cambria Math" panose="02040503050406030204" pitchFamily="18" charset="0"/>
+                              </a:rPr>
+                              <m:t>𝑁</m:t>
+                            </m:r>
+                          </m:e>
+                          <m:sub>
+                            <m:r>
+                              <a:rPr lang="fr-FR" sz="2400" i="1">
+                                <a:latin typeface="Cambria Math" panose="02040503050406030204" pitchFamily="18" charset="0"/>
+                              </a:rPr>
+                              <m:t>𝑗</m:t>
+                            </m:r>
+                          </m:sub>
+                        </m:sSub>
+                        <m:r>
+                          <a:rPr lang="fr-FR" sz="2400">
+                            <a:latin typeface="Cambria Math" panose="02040503050406030204" pitchFamily="18" charset="0"/>
+                          </a:rPr>
+                          <m:t>+</m:t>
+                        </m:r>
+                        <m:sSub>
+                          <m:sSubPr>
+                            <m:ctrlPr>
+                              <a:rPr lang="fr-FR" sz="2400" i="1">
+                                <a:latin typeface="Cambria Math" panose="02040503050406030204" pitchFamily="18" charset="0"/>
+                              </a:rPr>
+                            </m:ctrlPr>
+                          </m:sSubPr>
+                          <m:e>
+                            <m:r>
+                              <a:rPr lang="fr-FR" sz="2400" i="1">
+                                <a:latin typeface="Cambria Math" panose="02040503050406030204" pitchFamily="18" charset="0"/>
+                              </a:rPr>
+                              <m:t>𝜀</m:t>
+                            </m:r>
+                          </m:e>
+                          <m:sub>
+                            <m:r>
+                              <a:rPr lang="fr-FR" sz="2400" i="1">
+                                <a:latin typeface="Cambria Math" panose="02040503050406030204" pitchFamily="18" charset="0"/>
+                              </a:rPr>
+                              <m:t>𝑖𝑗𝑘</m:t>
+                            </m:r>
+                          </m:sub>
+                        </m:sSub>
+                      </m:oMath>
+                    </m:oMathPara>
+                  </a14:m>
+                  <a:endParaRPr lang="fr-FR" sz="2400" dirty="0"/>
+                </a:p>
+              </p:txBody>
+            </p:sp>
+          </mc:Choice>
+          <mc:Fallback>
+            <p:sp>
+              <p:nvSpPr>
+                <p:cNvPr id="107" name="Rectangle 106"/>
+                <p:cNvSpPr>
+                  <a:spLocks noRot="1" noChangeAspect="1" noMove="1" noResize="1" noEditPoints="1" noAdjustHandles="1" noChangeArrowheads="1" noChangeShapeType="1" noTextEdit="1"/>
+                </p:cNvSpPr>
+                <p:nvPr/>
+              </p:nvSpPr>
+              <p:spPr>
+                <a:xfrm>
+                  <a:off x="6767374" y="7327183"/>
+                  <a:ext cx="5245154" cy="491417"/>
+                </a:xfrm>
+                <a:prstGeom prst="rect">
+                  <a:avLst/>
+                </a:prstGeom>
+                <a:blipFill>
+                  <a:blip r:embed="rId3"/>
+                  <a:stretch>
+                    <a:fillRect b="-11250"/>
+                  </a:stretch>
+                </a:blipFill>
+              </p:spPr>
+              <p:txBody>
+                <a:bodyPr/>
+                <a:lstStyle/>
+                <a:p>
+                  <a:r>
+                    <a:rPr lang="fr-FR">
+                      <a:noFill/>
+                    </a:rPr>
+                    <a:t> </a:t>
+                  </a:r>
+                </a:p>
+              </p:txBody>
+            </p:sp>
+          </mc:Fallback>
+        </mc:AlternateContent>
+        <p:cxnSp>
+          <p:nvCxnSpPr>
+            <p:cNvPr id="112" name="Connecteur droit avec flèche 111"/>
+            <p:cNvCxnSpPr>
+              <a:endCxn id="118" idx="0"/>
+            </p:cNvCxnSpPr>
+            <p:nvPr/>
+          </p:nvCxnSpPr>
+          <p:spPr>
+            <a:xfrm>
+              <a:off x="10064840" y="7818600"/>
+              <a:ext cx="0" cy="605903"/>
+            </a:xfrm>
+            <a:prstGeom prst="straightConnector1">
+              <a:avLst/>
+            </a:prstGeom>
+            <a:ln>
+              <a:solidFill>
+                <a:schemeClr val="tx1"/>
+              </a:solidFill>
+              <a:tailEnd type="triangle"/>
+            </a:ln>
+          </p:spPr>
+          <p:style>
+            <a:lnRef idx="1">
+              <a:schemeClr val="accent1"/>
+            </a:lnRef>
+            <a:fillRef idx="0">
+              <a:schemeClr val="accent1"/>
+            </a:fillRef>
+            <a:effectRef idx="0">
+              <a:schemeClr val="accent1"/>
+            </a:effectRef>
+            <a:fontRef idx="minor">
+              <a:schemeClr val="tx1"/>
+            </a:fontRef>
+          </p:style>
+        </p:cxnSp>
+        <mc:AlternateContent xmlns:mc="http://schemas.openxmlformats.org/markup-compatibility/2006">
+          <mc:Choice xmlns:a14="http://schemas.microsoft.com/office/drawing/2010/main" Requires="a14">
+            <p:sp>
+              <p:nvSpPr>
+                <p:cNvPr id="118" name="Rectangle 117"/>
+                <p:cNvSpPr/>
+                <p:nvPr/>
+              </p:nvSpPr>
+              <p:spPr>
+                <a:xfrm>
+                  <a:off x="8574886" y="8424503"/>
+                  <a:ext cx="2979908" cy="461665"/>
+                </a:xfrm>
+                <a:prstGeom prst="rect">
+                  <a:avLst/>
+                </a:prstGeom>
+              </p:spPr>
+              <p:txBody>
+                <a:bodyPr wrap="square">
+                  <a:spAutoFit/>
+                </a:bodyPr>
+                <a:lstStyle/>
+                <a:p>
+                  <a:pPr/>
+                  <a14:m>
+                    <m:oMath xmlns:m="http://schemas.openxmlformats.org/officeDocument/2006/math">
+                      <m:r>
+                        <a:rPr lang="fr-FR" sz="2400" i="1">
+                          <a:latin typeface="Cambria Math" panose="02040503050406030204" pitchFamily="18" charset="0"/>
+                        </a:rPr>
+                        <m:t>𝑆𝐸𝐿𝐸𝐶𝑇𝐼𝑂</m:t>
+                      </m:r>
+                      <m:sSub>
+                        <m:sSubPr>
+                          <m:ctrlPr>
+                            <a:rPr lang="fr-FR" sz="2400" i="1">
+                              <a:latin typeface="Cambria Math" panose="02040503050406030204" pitchFamily="18" charset="0"/>
+                            </a:rPr>
+                          </m:ctrlPr>
+                        </m:sSubPr>
+                        <m:e>
+                          <m:r>
+                            <a:rPr lang="fr-FR" sz="2400" i="1">
+                              <a:latin typeface="Cambria Math" panose="02040503050406030204" pitchFamily="18" charset="0"/>
+                            </a:rPr>
+                            <m:t>𝑁</m:t>
+                          </m:r>
+                        </m:e>
+                        <m:sub>
+                          <m:r>
+                            <a:rPr lang="fr-FR" sz="2400" i="1">
+                              <a:latin typeface="Cambria Math" panose="02040503050406030204" pitchFamily="18" charset="0"/>
+                            </a:rPr>
+                            <m:t>𝐸𝑃𝐼</m:t>
+                          </m:r>
+                        </m:sub>
+                      </m:sSub>
+                    </m:oMath>
+                  </a14:m>
+                  <a:r>
+                    <a:rPr lang="fr-FR" sz="2400" dirty="0" smtClean="0"/>
+                    <a:t> = </a:t>
+                  </a:r>
+                  <a:r>
+                    <a:rPr lang="fr-FR" sz="2400" dirty="0"/>
+                    <a:t>R</a:t>
+                  </a:r>
+                  <a:r>
+                    <a:rPr lang="fr-FR" sz="2400" baseline="-25000" dirty="0"/>
+                    <a:t>EPI</a:t>
+                  </a:r>
+                  <a:endParaRPr lang="fr-FR" sz="2400" dirty="0"/>
+                </a:p>
+              </p:txBody>
+            </p:sp>
+          </mc:Choice>
+          <mc:Fallback>
+            <p:sp>
+              <p:nvSpPr>
+                <p:cNvPr id="118" name="Rectangle 117"/>
+                <p:cNvSpPr>
+                  <a:spLocks noRot="1" noChangeAspect="1" noMove="1" noResize="1" noEditPoints="1" noAdjustHandles="1" noChangeArrowheads="1" noChangeShapeType="1" noTextEdit="1"/>
+                </p:cNvSpPr>
+                <p:nvPr/>
+              </p:nvSpPr>
+              <p:spPr>
+                <a:xfrm>
+                  <a:off x="8574886" y="8424503"/>
+                  <a:ext cx="2979908" cy="461665"/>
+                </a:xfrm>
+                <a:prstGeom prst="rect">
+                  <a:avLst/>
+                </a:prstGeom>
+                <a:blipFill>
+                  <a:blip r:embed="rId4"/>
+                  <a:stretch>
+                    <a:fillRect l="-613" t="-10526" b="-28947"/>
+                  </a:stretch>
+                </a:blipFill>
+              </p:spPr>
+              <p:txBody>
+                <a:bodyPr/>
+                <a:lstStyle/>
+                <a:p>
+                  <a:r>
+                    <a:rPr lang="fr-FR">
+                      <a:noFill/>
+                    </a:rPr>
+                    <a:t> </a:t>
+                  </a:r>
+                </a:p>
+              </p:txBody>
+            </p:sp>
+          </mc:Fallback>
+        </mc:AlternateContent>
+      </p:grpSp>
+      <p:grpSp>
+        <p:nvGrpSpPr>
+          <p:cNvPr id="27" name="Groupe 26"/>
+          <p:cNvGrpSpPr/>
+          <p:nvPr/>
+        </p:nvGrpSpPr>
+        <p:grpSpPr>
+          <a:xfrm>
+            <a:off x="8283063" y="169074"/>
+            <a:ext cx="7796269" cy="10218182"/>
+            <a:chOff x="8442718" y="154560"/>
+            <a:chExt cx="7796269" cy="10218182"/>
+          </a:xfrm>
+        </p:grpSpPr>
+        <p:sp>
+          <p:nvSpPr>
+            <p:cNvPr id="52" name="ZoneTexte 51"/>
+            <p:cNvSpPr txBox="1"/>
+            <p:nvPr/>
+          </p:nvSpPr>
+          <p:spPr>
+            <a:xfrm>
+              <a:off x="8442718" y="154560"/>
+              <a:ext cx="7796269" cy="10218182"/>
+            </a:xfrm>
+            <a:prstGeom prst="rect">
+              <a:avLst/>
+            </a:prstGeom>
+            <a:noFill/>
+            <a:ln>
+              <a:solidFill>
+                <a:schemeClr val="tx1"/>
+              </a:solidFill>
+            </a:ln>
+          </p:spPr>
+          <p:txBody>
+            <a:bodyPr wrap="square" rtlCol="0">
+              <a:spAutoFit/>
+            </a:bodyPr>
+            <a:lstStyle/>
+            <a:p>
+              <a:r>
+                <a:rPr lang="fr-FR" sz="2800" b="1" dirty="0"/>
+                <a:t>Sélection sur </a:t>
+              </a:r>
+              <a:r>
+                <a:rPr lang="fr-FR" sz="2800" b="1" dirty="0" smtClean="0"/>
+                <a:t>grain</a:t>
+              </a:r>
+              <a:endParaRPr lang="fr-FR" sz="2800" b="1" dirty="0"/>
+            </a:p>
+            <a:p>
+              <a:endParaRPr lang="fr-FR" dirty="0"/>
+            </a:p>
+            <a:p>
+              <a:endParaRPr lang="fr-FR" dirty="0"/>
+            </a:p>
+            <a:p>
+              <a:endParaRPr lang="fr-FR" dirty="0"/>
+            </a:p>
+            <a:p>
+              <a:endParaRPr lang="fr-FR" dirty="0"/>
+            </a:p>
+            <a:p>
+              <a:endParaRPr lang="fr-FR" dirty="0"/>
+            </a:p>
+            <a:p>
+              <a:endParaRPr lang="fr-FR" dirty="0"/>
+            </a:p>
+            <a:p>
+              <a:endParaRPr lang="fr-FR" dirty="0"/>
+            </a:p>
+            <a:p>
+              <a:endParaRPr lang="fr-FR" dirty="0"/>
+            </a:p>
+            <a:p>
+              <a:endParaRPr lang="fr-FR" dirty="0"/>
+            </a:p>
+            <a:p>
+              <a:endParaRPr lang="fr-FR" dirty="0"/>
+            </a:p>
+            <a:p>
+              <a:endParaRPr lang="fr-FR" dirty="0"/>
+            </a:p>
+            <a:p>
+              <a:endParaRPr lang="fr-FR" dirty="0"/>
+            </a:p>
+            <a:p>
+              <a:endParaRPr lang="fr-FR" dirty="0"/>
+            </a:p>
+            <a:p>
+              <a:endParaRPr lang="fr-FR" dirty="0"/>
+            </a:p>
+            <a:p>
+              <a:endParaRPr lang="fr-FR" dirty="0"/>
+            </a:p>
+            <a:p>
+              <a:endParaRPr lang="fr-FR" dirty="0"/>
+            </a:p>
+            <a:p>
+              <a:endParaRPr lang="fr-FR" dirty="0"/>
+            </a:p>
+            <a:p>
+              <a:endParaRPr lang="fr-FR" dirty="0"/>
+            </a:p>
+            <a:p>
+              <a:endParaRPr lang="fr-FR" dirty="0"/>
+            </a:p>
+            <a:p>
+              <a:endParaRPr lang="fr-FR" dirty="0"/>
+            </a:p>
+            <a:p>
+              <a:endParaRPr lang="fr-FR" dirty="0"/>
+            </a:p>
+            <a:p>
+              <a:endParaRPr lang="fr-FR" dirty="0"/>
+            </a:p>
+            <a:p>
+              <a:endParaRPr lang="fr-FR" dirty="0"/>
+            </a:p>
+            <a:p>
+              <a:endParaRPr lang="fr-FR" dirty="0"/>
+            </a:p>
+            <a:p>
+              <a:endParaRPr lang="fr-FR" dirty="0"/>
+            </a:p>
+            <a:p>
+              <a:endParaRPr lang="fr-FR" dirty="0"/>
+            </a:p>
+            <a:p>
+              <a:endParaRPr lang="fr-FR" dirty="0"/>
+            </a:p>
+            <a:p>
+              <a:endParaRPr lang="fr-FR" dirty="0"/>
+            </a:p>
+            <a:p>
+              <a:endParaRPr lang="fr-FR" dirty="0"/>
+            </a:p>
+            <a:p>
+              <a:endParaRPr lang="fr-FR" dirty="0" smtClean="0"/>
+            </a:p>
+            <a:p>
+              <a:endParaRPr lang="fr-FR" dirty="0"/>
+            </a:p>
+            <a:p>
+              <a:endParaRPr lang="fr-FR" dirty="0" smtClean="0"/>
+            </a:p>
+            <a:p>
+              <a:endParaRPr lang="fr-FR" dirty="0"/>
+            </a:p>
+            <a:p>
+              <a:r>
+                <a:rPr lang="fr-FR" sz="2000" dirty="0"/>
+                <a:t>La sélection sur </a:t>
+              </a:r>
+              <a:r>
+                <a:rPr lang="fr-FR" sz="2000" dirty="0" smtClean="0"/>
+                <a:t>grain </a:t>
+              </a:r>
+              <a:r>
+                <a:rPr lang="fr-FR" sz="2000" dirty="0"/>
+                <a:t>se fait sur des </a:t>
+              </a:r>
+              <a:r>
+                <a:rPr lang="fr-FR" sz="2000" dirty="0" smtClean="0"/>
+                <a:t>tailles </a:t>
+              </a:r>
+              <a:r>
+                <a:rPr lang="fr-FR" sz="2000" dirty="0"/>
+                <a:t>de </a:t>
+              </a:r>
+              <a:r>
+                <a:rPr lang="fr-FR" sz="2000" dirty="0" smtClean="0"/>
+                <a:t>grains individuels, </a:t>
+              </a:r>
+              <a:r>
+                <a:rPr lang="fr-FR" sz="2000" dirty="0"/>
+                <a:t>le progrès est mesuré à partir de </a:t>
+              </a:r>
+              <a:r>
+                <a:rPr lang="fr-FR" sz="2000" dirty="0" smtClean="0"/>
+                <a:t>tailles </a:t>
+              </a:r>
+              <a:r>
+                <a:rPr lang="fr-FR" sz="2000" dirty="0"/>
+                <a:t>de </a:t>
+              </a:r>
+              <a:r>
+                <a:rPr lang="fr-FR" sz="2000" dirty="0" smtClean="0"/>
+                <a:t>grains individuels</a:t>
+              </a:r>
+              <a:endParaRPr lang="fr-FR" sz="2000" dirty="0"/>
+            </a:p>
+          </p:txBody>
+        </p:sp>
+        <p:sp>
+          <p:nvSpPr>
+            <p:cNvPr id="6" name="Rectangle 5"/>
+            <p:cNvSpPr/>
+            <p:nvPr/>
+          </p:nvSpPr>
+          <p:spPr>
+            <a:xfrm>
+              <a:off x="8814735" y="1076756"/>
+              <a:ext cx="1348244" cy="1783080"/>
+            </a:xfrm>
+            <a:prstGeom prst="rect">
+              <a:avLst/>
+            </a:prstGeom>
+            <a:ln>
+              <a:noFill/>
+            </a:ln>
+          </p:spPr>
+          <p:style>
+            <a:lnRef idx="2">
+              <a:schemeClr val="accent1">
+                <a:shade val="50000"/>
+              </a:schemeClr>
+            </a:lnRef>
+            <a:fillRef idx="1">
+              <a:schemeClr val="accent1"/>
+            </a:fillRef>
+            <a:effectRef idx="0">
+              <a:schemeClr val="accent1"/>
+            </a:effectRef>
+            <a:fontRef idx="minor">
+              <a:schemeClr val="lt1"/>
+            </a:fontRef>
+          </p:style>
+          <p:txBody>
+            <a:bodyPr rot="0" spcFirstLastPara="0" vertOverflow="overflow" horzOverflow="overflow" vert="horz" wrap="square" lIns="91440" tIns="45720" rIns="91440" bIns="45720" numCol="1" spcCol="0" rtlCol="0" fromWordArt="0" anchor="ctr" anchorCtr="0" forceAA="0" compatLnSpc="1">
+              <a:prstTxWarp prst="textNoShape">
+                <a:avLst/>
+              </a:prstTxWarp>
+              <a:noAutofit/>
+            </a:bodyPr>
+            <a:lstStyle/>
+            <a:p>
+              <a:pPr algn="ctr"/>
+              <a:r>
+                <a:rPr lang="fr-FR" dirty="0"/>
+                <a:t>Données des bacs</a:t>
+              </a:r>
+            </a:p>
+          </p:txBody>
+        </p:sp>
+        <p:sp>
+          <p:nvSpPr>
+            <p:cNvPr id="8" name="ZoneTexte 7"/>
+            <p:cNvSpPr txBox="1"/>
+            <p:nvPr/>
+          </p:nvSpPr>
+          <p:spPr>
+            <a:xfrm>
+              <a:off x="10465072" y="1059113"/>
+              <a:ext cx="1615980" cy="523220"/>
+            </a:xfrm>
+            <a:prstGeom prst="rect">
+              <a:avLst/>
+            </a:prstGeom>
+            <a:noFill/>
+          </p:spPr>
+          <p:txBody>
+            <a:bodyPr wrap="square" rtlCol="0">
+              <a:spAutoFit/>
+            </a:bodyPr>
+            <a:lstStyle/>
+            <a:p>
+              <a:r>
+                <a:rPr lang="fr-FR" sz="1400" dirty="0" err="1"/>
+                <a:t>nsel</a:t>
+              </a:r>
+              <a:r>
+                <a:rPr lang="fr-FR" sz="1400" dirty="0"/>
+                <a:t> grains plantés les plus gros</a:t>
+              </a:r>
+            </a:p>
+          </p:txBody>
+        </p:sp>
+        <p:sp>
+          <p:nvSpPr>
+            <p:cNvPr id="14" name="Rectangle 13"/>
+            <p:cNvSpPr/>
+            <p:nvPr/>
+          </p:nvSpPr>
+          <p:spPr>
+            <a:xfrm>
+              <a:off x="10615674" y="2075316"/>
+              <a:ext cx="1348244" cy="826008"/>
+            </a:xfrm>
+            <a:prstGeom prst="rect">
+              <a:avLst/>
+            </a:prstGeom>
+            <a:solidFill>
+              <a:schemeClr val="accent2">
+                <a:lumMod val="60000"/>
+                <a:lumOff val="40000"/>
+              </a:schemeClr>
+            </a:solidFill>
+            <a:ln>
+              <a:noFill/>
+            </a:ln>
+          </p:spPr>
+          <p:style>
+            <a:lnRef idx="2">
+              <a:schemeClr val="accent1">
+                <a:shade val="50000"/>
+              </a:schemeClr>
+            </a:lnRef>
+            <a:fillRef idx="1">
+              <a:schemeClr val="accent1"/>
+            </a:fillRef>
+            <a:effectRef idx="0">
+              <a:schemeClr val="accent1"/>
+            </a:effectRef>
+            <a:fontRef idx="minor">
+              <a:schemeClr val="lt1"/>
+            </a:fontRef>
+          </p:style>
+          <p:txBody>
+            <a:bodyPr rot="0" spcFirstLastPara="0" vertOverflow="overflow" horzOverflow="overflow" vert="horz" wrap="square" lIns="91440" tIns="45720" rIns="91440" bIns="45720" numCol="1" spcCol="0" rtlCol="0" fromWordArt="0" anchor="ctr" anchorCtr="0" forceAA="0" compatLnSpc="1">
+              <a:prstTxWarp prst="textNoShape">
+                <a:avLst/>
+              </a:prstTxWarp>
+              <a:noAutofit/>
+            </a:bodyPr>
+            <a:lstStyle/>
+            <a:p>
+              <a:pPr algn="ctr"/>
+              <a:r>
+                <a:rPr lang="fr-FR" sz="1600" dirty="0" smtClean="0">
+                  <a:solidFill>
+                    <a:schemeClr val="tx1"/>
+                  </a:solidFill>
+                </a:rPr>
+                <a:t>Individus sélectionnés sur grain</a:t>
+              </a:r>
+              <a:endParaRPr lang="fr-FR" sz="1600" dirty="0">
+                <a:solidFill>
+                  <a:schemeClr val="tx1"/>
+                </a:solidFill>
+              </a:endParaRPr>
+            </a:p>
+          </p:txBody>
+        </p:sp>
+        <p:cxnSp>
+          <p:nvCxnSpPr>
+            <p:cNvPr id="31" name="Connecteur en angle 30"/>
+            <p:cNvCxnSpPr>
+              <a:stCxn id="88" idx="1"/>
+              <a:endCxn id="14" idx="0"/>
+            </p:cNvCxnSpPr>
+            <p:nvPr/>
+          </p:nvCxnSpPr>
+          <p:spPr>
+            <a:xfrm>
+              <a:off x="10465072" y="1589427"/>
+              <a:ext cx="824723" cy="485889"/>
+            </a:xfrm>
+            <a:prstGeom prst="bentConnector2">
+              <a:avLst/>
+            </a:prstGeom>
+            <a:ln w="28575">
+              <a:solidFill>
+                <a:schemeClr val="tx1"/>
+              </a:solidFill>
+              <a:tailEnd type="triangle"/>
+            </a:ln>
+          </p:spPr>
+          <p:style>
+            <a:lnRef idx="1">
+              <a:schemeClr val="accent1"/>
+            </a:lnRef>
+            <a:fillRef idx="0">
+              <a:schemeClr val="accent1"/>
+            </a:fillRef>
+            <a:effectRef idx="0">
+              <a:schemeClr val="accent1"/>
+            </a:effectRef>
+            <a:fontRef idx="minor">
+              <a:schemeClr val="tx1"/>
+            </a:fontRef>
+          </p:style>
+        </p:cxnSp>
+        <p:sp>
+          <p:nvSpPr>
+            <p:cNvPr id="88" name="Accolade ouvrante 87"/>
+            <p:cNvSpPr/>
+            <p:nvPr/>
+          </p:nvSpPr>
+          <p:spPr>
+            <a:xfrm flipH="1">
+              <a:off x="10232843" y="1116156"/>
+              <a:ext cx="232229" cy="946541"/>
+            </a:xfrm>
+            <a:prstGeom prst="leftBrace">
+              <a:avLst/>
+            </a:prstGeom>
+            <a:ln>
+              <a:solidFill>
+                <a:schemeClr val="tx1"/>
+              </a:solidFill>
+            </a:ln>
+          </p:spPr>
+          <p:style>
+            <a:lnRef idx="1">
+              <a:schemeClr val="accent1"/>
+            </a:lnRef>
+            <a:fillRef idx="0">
+              <a:schemeClr val="accent1"/>
+            </a:fillRef>
+            <a:effectRef idx="0">
+              <a:schemeClr val="accent1"/>
+            </a:effectRef>
+            <a:fontRef idx="minor">
+              <a:schemeClr val="tx1"/>
+            </a:fontRef>
+          </p:style>
+          <p:txBody>
+            <a:bodyPr rtlCol="0" anchor="ctr"/>
+            <a:lstStyle/>
+            <a:p>
+              <a:pPr algn="ctr"/>
+              <a:endParaRPr lang="fr-FR"/>
+            </a:p>
+          </p:txBody>
+        </p:sp>
+        <p:sp>
+          <p:nvSpPr>
+            <p:cNvPr id="79" name="Arc 78"/>
+            <p:cNvSpPr/>
+            <p:nvPr/>
+          </p:nvSpPr>
+          <p:spPr>
+            <a:xfrm rot="5400000" flipV="1">
+              <a:off x="12063562" y="1946342"/>
+              <a:ext cx="1626443" cy="1899962"/>
+            </a:xfrm>
+            <a:prstGeom prst="arc">
+              <a:avLst>
+                <a:gd name="adj1" fmla="val 11463237"/>
+                <a:gd name="adj2" fmla="val 19313475"/>
+              </a:avLst>
+            </a:prstGeom>
+            <a:ln w="28575">
+              <a:solidFill>
+                <a:schemeClr val="tx1"/>
+              </a:solidFill>
+            </a:ln>
+          </p:spPr>
+          <p:style>
+            <a:lnRef idx="1">
+              <a:schemeClr val="accent1"/>
+            </a:lnRef>
+            <a:fillRef idx="0">
+              <a:schemeClr val="accent1"/>
+            </a:fillRef>
+            <a:effectRef idx="0">
+              <a:schemeClr val="accent1"/>
+            </a:effectRef>
+            <a:fontRef idx="minor">
+              <a:schemeClr val="tx1"/>
+            </a:fontRef>
+          </p:style>
+          <p:txBody>
+            <a:bodyPr rtlCol="0" anchor="ctr"/>
+            <a:lstStyle/>
+            <a:p>
+              <a:pPr algn="ctr"/>
+              <a:endParaRPr lang="fr-FR"/>
+            </a:p>
+          </p:txBody>
+        </p:sp>
+        <p:cxnSp>
+          <p:nvCxnSpPr>
+            <p:cNvPr id="81" name="Connecteur droit avec flèche 80"/>
+            <p:cNvCxnSpPr>
+              <a:stCxn id="79" idx="2"/>
+              <a:endCxn id="92" idx="1"/>
+            </p:cNvCxnSpPr>
+            <p:nvPr/>
+          </p:nvCxnSpPr>
+          <p:spPr>
+            <a:xfrm>
+              <a:off x="12347230" y="3571476"/>
+              <a:ext cx="379335" cy="143301"/>
+            </a:xfrm>
+            <a:prstGeom prst="straightConnector1">
+              <a:avLst/>
+            </a:prstGeom>
+            <a:ln w="28575">
+              <a:solidFill>
+                <a:schemeClr val="tx1"/>
+              </a:solidFill>
+              <a:tailEnd type="triangle"/>
+            </a:ln>
+          </p:spPr>
+          <p:style>
+            <a:lnRef idx="1">
+              <a:schemeClr val="accent1"/>
+            </a:lnRef>
+            <a:fillRef idx="0">
+              <a:schemeClr val="accent1"/>
+            </a:fillRef>
+            <a:effectRef idx="0">
+              <a:schemeClr val="accent1"/>
+            </a:effectRef>
+            <a:fontRef idx="minor">
+              <a:schemeClr val="tx1"/>
+            </a:fontRef>
+          </p:style>
+        </p:cxnSp>
+        <p:sp>
+          <p:nvSpPr>
+            <p:cNvPr id="90" name="Rectangle 89"/>
+            <p:cNvSpPr/>
+            <p:nvPr/>
+          </p:nvSpPr>
+          <p:spPr>
+            <a:xfrm>
+              <a:off x="12726565" y="398827"/>
+              <a:ext cx="1968970" cy="2367012"/>
+            </a:xfrm>
+            <a:prstGeom prst="rect">
+              <a:avLst/>
+            </a:prstGeom>
+            <a:solidFill>
+              <a:schemeClr val="accent1">
+                <a:lumMod val="50000"/>
+              </a:schemeClr>
+            </a:solidFill>
+            <a:ln>
+              <a:noFill/>
+            </a:ln>
+          </p:spPr>
+          <p:style>
+            <a:lnRef idx="2">
+              <a:schemeClr val="accent1">
+                <a:shade val="50000"/>
+              </a:schemeClr>
+            </a:lnRef>
+            <a:fillRef idx="1">
+              <a:schemeClr val="accent1"/>
+            </a:fillRef>
+            <a:effectRef idx="0">
+              <a:schemeClr val="accent1"/>
+            </a:effectRef>
+            <a:fontRef idx="minor">
+              <a:schemeClr val="lt1"/>
+            </a:fontRef>
+          </p:style>
+          <p:txBody>
+            <a:bodyPr rot="0" spcFirstLastPara="0" vertOverflow="overflow" horzOverflow="overflow" vert="horz" wrap="square" lIns="91440" tIns="45720" rIns="91440" bIns="45720" numCol="1" spcCol="0" rtlCol="0" fromWordArt="0" anchor="ctr" anchorCtr="0" forceAA="0" compatLnSpc="1">
+              <a:prstTxWarp prst="textNoShape">
+                <a:avLst/>
+              </a:prstTxWarp>
+              <a:noAutofit/>
+            </a:bodyPr>
+            <a:lstStyle/>
+            <a:p>
+              <a:pPr algn="ctr"/>
+              <a:r>
+                <a:rPr lang="fr-FR" dirty="0" smtClean="0"/>
+                <a:t>Données Optomachine </a:t>
+              </a:r>
+              <a:r>
+                <a:rPr lang="fr-FR" dirty="0"/>
+                <a:t>des </a:t>
+              </a:r>
+              <a:r>
+                <a:rPr lang="fr-FR" dirty="0" smtClean="0"/>
+                <a:t>bacs (mesures sur grains individuels)</a:t>
+              </a:r>
+              <a:endParaRPr lang="fr-FR" dirty="0"/>
+            </a:p>
+          </p:txBody>
+        </p:sp>
+        <mc:AlternateContent xmlns:mc="http://schemas.openxmlformats.org/markup-compatibility/2006">
+          <mc:Choice xmlns:a14="http://schemas.microsoft.com/office/drawing/2010/main" Requires="a14">
+            <p:sp>
+              <p:nvSpPr>
+                <p:cNvPr id="85" name="Rectangle 84"/>
+                <p:cNvSpPr/>
+                <p:nvPr/>
+              </p:nvSpPr>
+              <p:spPr>
+                <a:xfrm>
+                  <a:off x="10667180" y="5519088"/>
+                  <a:ext cx="5245154" cy="491417"/>
+                </a:xfrm>
+                <a:prstGeom prst="rect">
+                  <a:avLst/>
+                </a:prstGeom>
+              </p:spPr>
+              <p:txBody>
+                <a:bodyPr wrap="none">
+                  <a:spAutoFit/>
+                </a:bodyPr>
+                <a:lstStyle/>
+                <a:p>
+                  <a:pPr/>
+                  <a14:m>
+                    <m:oMathPara xmlns:m="http://schemas.openxmlformats.org/officeDocument/2006/math">
+                      <m:oMathParaPr>
+                        <m:jc m:val="centerGroup"/>
+                      </m:oMathParaPr>
+                      <m:oMath xmlns:m="http://schemas.openxmlformats.org/officeDocument/2006/math">
+                        <m:sSub>
+                          <m:sSubPr>
+                            <m:ctrlPr>
+                              <a:rPr lang="fr-FR" sz="2400" i="1">
+                                <a:latin typeface="Cambria Math" panose="02040503050406030204" pitchFamily="18" charset="0"/>
+                              </a:rPr>
+                            </m:ctrlPr>
+                          </m:sSubPr>
+                          <m:e>
+                            <m:r>
+                              <a:rPr lang="fr-FR" sz="2400" i="1">
+                                <a:latin typeface="Cambria Math" panose="02040503050406030204" pitchFamily="18" charset="0"/>
+                              </a:rPr>
+                              <m:t>𝑌</m:t>
+                            </m:r>
+                          </m:e>
+                          <m:sub>
+                            <m:r>
+                              <a:rPr lang="fr-FR" sz="2400" i="1">
+                                <a:latin typeface="Cambria Math" panose="02040503050406030204" pitchFamily="18" charset="0"/>
+                              </a:rPr>
+                              <m:t>𝑖𝑗𝑘</m:t>
+                            </m:r>
+                          </m:sub>
+                        </m:sSub>
+                        <m:r>
+                          <a:rPr lang="fr-FR" sz="2400">
+                            <a:latin typeface="Cambria Math" panose="02040503050406030204" pitchFamily="18" charset="0"/>
+                          </a:rPr>
+                          <m:t>=µ+</m:t>
+                        </m:r>
+                        <m:r>
+                          <a:rPr lang="fr-FR" sz="2400" i="1">
+                            <a:latin typeface="Cambria Math" panose="02040503050406030204" pitchFamily="18" charset="0"/>
+                          </a:rPr>
+                          <m:t>𝐵𝐴</m:t>
+                        </m:r>
+                        <m:sSub>
+                          <m:sSubPr>
+                            <m:ctrlPr>
+                              <a:rPr lang="fr-FR" sz="2400" i="1">
+                                <a:latin typeface="Cambria Math" panose="02040503050406030204" pitchFamily="18" charset="0"/>
+                              </a:rPr>
+                            </m:ctrlPr>
+                          </m:sSubPr>
+                          <m:e>
+                            <m:r>
+                              <a:rPr lang="fr-FR" sz="2400" i="1">
+                                <a:latin typeface="Cambria Math" panose="02040503050406030204" pitchFamily="18" charset="0"/>
+                              </a:rPr>
+                              <m:t>𝐶</m:t>
+                            </m:r>
+                          </m:e>
+                          <m:sub>
+                            <m:r>
+                              <a:rPr lang="fr-FR" sz="2400" i="1">
+                                <a:latin typeface="Cambria Math" panose="02040503050406030204" pitchFamily="18" charset="0"/>
+                              </a:rPr>
+                              <m:t>𝑖</m:t>
+                            </m:r>
+                          </m:sub>
+                        </m:sSub>
+                        <m:r>
+                          <a:rPr lang="fr-FR" sz="2400">
+                            <a:latin typeface="Cambria Math" panose="02040503050406030204" pitchFamily="18" charset="0"/>
+                          </a:rPr>
+                          <m:t>+</m:t>
+                        </m:r>
+                        <m:r>
+                          <a:rPr lang="fr-FR" sz="2400" i="1">
+                            <a:latin typeface="Cambria Math" panose="02040503050406030204" pitchFamily="18" charset="0"/>
+                          </a:rPr>
+                          <m:t>𝑆𝐸𝐿𝐸𝐶𝑇𝐼𝑂</m:t>
+                        </m:r>
+                        <m:sSub>
+                          <m:sSubPr>
+                            <m:ctrlPr>
+                              <a:rPr lang="fr-FR" sz="2400" i="1">
+                                <a:latin typeface="Cambria Math" panose="02040503050406030204" pitchFamily="18" charset="0"/>
+                              </a:rPr>
+                            </m:ctrlPr>
+                          </m:sSubPr>
+                          <m:e>
+                            <m:r>
+                              <a:rPr lang="fr-FR" sz="2400" i="1">
+                                <a:latin typeface="Cambria Math" panose="02040503050406030204" pitchFamily="18" charset="0"/>
+                              </a:rPr>
+                              <m:t>𝑁</m:t>
+                            </m:r>
+                          </m:e>
+                          <m:sub>
+                            <m:r>
+                              <a:rPr lang="fr-FR" sz="2400" i="1">
+                                <a:latin typeface="Cambria Math" panose="02040503050406030204" pitchFamily="18" charset="0"/>
+                              </a:rPr>
+                              <m:t>𝑗</m:t>
+                            </m:r>
+                          </m:sub>
+                        </m:sSub>
+                        <m:r>
+                          <a:rPr lang="fr-FR" sz="2400">
+                            <a:latin typeface="Cambria Math" panose="02040503050406030204" pitchFamily="18" charset="0"/>
+                          </a:rPr>
+                          <m:t>+</m:t>
+                        </m:r>
+                        <m:sSub>
+                          <m:sSubPr>
+                            <m:ctrlPr>
+                              <a:rPr lang="fr-FR" sz="2400" i="1">
+                                <a:latin typeface="Cambria Math" panose="02040503050406030204" pitchFamily="18" charset="0"/>
+                              </a:rPr>
+                            </m:ctrlPr>
+                          </m:sSubPr>
+                          <m:e>
+                            <m:r>
+                              <a:rPr lang="fr-FR" sz="2400" i="1">
+                                <a:latin typeface="Cambria Math" panose="02040503050406030204" pitchFamily="18" charset="0"/>
+                              </a:rPr>
+                              <m:t>𝜀</m:t>
+                            </m:r>
+                          </m:e>
+                          <m:sub>
+                            <m:r>
+                              <a:rPr lang="fr-FR" sz="2400" i="1">
+                                <a:latin typeface="Cambria Math" panose="02040503050406030204" pitchFamily="18" charset="0"/>
+                              </a:rPr>
+                              <m:t>𝑖𝑗𝑘</m:t>
+                            </m:r>
+                          </m:sub>
+                        </m:sSub>
+                      </m:oMath>
+                    </m:oMathPara>
+                  </a14:m>
+                  <a:endParaRPr lang="fr-FR" sz="2400" dirty="0"/>
+                </a:p>
+              </p:txBody>
+            </p:sp>
+          </mc:Choice>
+          <mc:Fallback>
+            <p:sp>
+              <p:nvSpPr>
+                <p:cNvPr id="85" name="Rectangle 84"/>
+                <p:cNvSpPr>
+                  <a:spLocks noRot="1" noChangeAspect="1" noMove="1" noResize="1" noEditPoints="1" noAdjustHandles="1" noChangeArrowheads="1" noChangeShapeType="1" noTextEdit="1"/>
+                </p:cNvSpPr>
+                <p:nvPr/>
+              </p:nvSpPr>
+              <p:spPr>
+                <a:xfrm>
+                  <a:off x="10667180" y="5519088"/>
+                  <a:ext cx="5245154" cy="491417"/>
+                </a:xfrm>
+                <a:prstGeom prst="rect">
+                  <a:avLst/>
+                </a:prstGeom>
+                <a:blipFill>
+                  <a:blip r:embed="rId5"/>
+                  <a:stretch>
+                    <a:fillRect b="-11250"/>
+                  </a:stretch>
+                </a:blipFill>
+              </p:spPr>
+              <p:txBody>
+                <a:bodyPr/>
+                <a:lstStyle/>
+                <a:p>
+                  <a:r>
+                    <a:rPr lang="fr-FR">
+                      <a:noFill/>
+                    </a:rPr>
+                    <a:t> </a:t>
+                  </a:r>
+                </a:p>
+              </p:txBody>
+            </p:sp>
+          </mc:Fallback>
+        </mc:AlternateContent>
+        <p:cxnSp>
+          <p:nvCxnSpPr>
+            <p:cNvPr id="86" name="Connecteur droit avec flèche 85"/>
+            <p:cNvCxnSpPr/>
+            <p:nvPr/>
+          </p:nvCxnSpPr>
+          <p:spPr>
+            <a:xfrm>
+              <a:off x="14166888" y="5958277"/>
+              <a:ext cx="2176" cy="451387"/>
+            </a:xfrm>
+            <a:prstGeom prst="straightConnector1">
+              <a:avLst/>
+            </a:prstGeom>
+            <a:ln>
+              <a:solidFill>
+                <a:schemeClr val="tx1"/>
+              </a:solidFill>
+              <a:tailEnd type="triangle"/>
+            </a:ln>
+          </p:spPr>
+          <p:style>
+            <a:lnRef idx="1">
+              <a:schemeClr val="accent1"/>
+            </a:lnRef>
+            <a:fillRef idx="0">
+              <a:schemeClr val="accent1"/>
+            </a:fillRef>
+            <a:effectRef idx="0">
+              <a:schemeClr val="accent1"/>
+            </a:effectRef>
+            <a:fontRef idx="minor">
+              <a:schemeClr val="tx1"/>
+            </a:fontRef>
+          </p:style>
+        </p:cxnSp>
+        <mc:AlternateContent xmlns:mc="http://schemas.openxmlformats.org/markup-compatibility/2006">
+          <mc:Choice xmlns:a14="http://schemas.microsoft.com/office/drawing/2010/main" Requires="a14">
+            <p:sp>
+              <p:nvSpPr>
+                <p:cNvPr id="89" name="Rectangle 88"/>
+                <p:cNvSpPr/>
+                <p:nvPr/>
+              </p:nvSpPr>
+              <p:spPr>
+                <a:xfrm>
+                  <a:off x="12340852" y="6409664"/>
+                  <a:ext cx="3656425" cy="491738"/>
+                </a:xfrm>
+                <a:prstGeom prst="rect">
+                  <a:avLst/>
+                </a:prstGeom>
+              </p:spPr>
+              <p:txBody>
+                <a:bodyPr wrap="square">
+                  <a:spAutoFit/>
+                </a:bodyPr>
+                <a:lstStyle/>
+                <a:p>
+                  <a:pPr/>
+                  <a14:m>
+                    <m:oMath xmlns:m="http://schemas.openxmlformats.org/officeDocument/2006/math">
+                      <m:r>
+                        <a:rPr lang="fr-FR" sz="2400" i="1" smtClean="0">
+                          <a:latin typeface="Cambria Math" panose="02040503050406030204" pitchFamily="18" charset="0"/>
+                        </a:rPr>
+                        <m:t>𝑆𝐸𝐿𝐸𝐶𝑇𝐼𝑂</m:t>
+                      </m:r>
+                      <m:sSub>
+                        <m:sSubPr>
+                          <m:ctrlPr>
+                            <a:rPr lang="fr-FR" sz="2400" i="1">
+                              <a:latin typeface="Cambria Math" panose="02040503050406030204" pitchFamily="18" charset="0"/>
+                            </a:rPr>
+                          </m:ctrlPr>
+                        </m:sSubPr>
+                        <m:e>
+                          <m:r>
+                            <a:rPr lang="fr-FR" sz="2400" i="1">
+                              <a:latin typeface="Cambria Math" panose="02040503050406030204" pitchFamily="18" charset="0"/>
+                            </a:rPr>
+                            <m:t>𝑁</m:t>
+                          </m:r>
+                        </m:e>
+                        <m:sub>
+                          <m:r>
+                            <a:rPr lang="fr-FR" sz="2400" b="0" i="1" smtClean="0">
+                              <a:latin typeface="Cambria Math" panose="02040503050406030204" pitchFamily="18" charset="0"/>
+                            </a:rPr>
+                            <m:t>𝑔𝑟𝑎𝑖𝑛</m:t>
+                          </m:r>
+                        </m:sub>
+                      </m:sSub>
+                    </m:oMath>
+                  </a14:m>
+                  <a:r>
+                    <a:rPr lang="fr-FR" sz="2400" dirty="0" smtClean="0"/>
+                    <a:t> =  </a:t>
+                  </a:r>
+                  <a:r>
+                    <a:rPr lang="fr-FR" sz="2400" dirty="0" err="1" smtClean="0"/>
+                    <a:t>R</a:t>
+                  </a:r>
+                  <a:r>
+                    <a:rPr lang="fr-FR" sz="2400" baseline="-25000" dirty="0" err="1" smtClean="0"/>
+                    <a:t>grain</a:t>
+                  </a:r>
+                  <a:endParaRPr lang="fr-FR" sz="2400" dirty="0"/>
+                </a:p>
+              </p:txBody>
+            </p:sp>
+          </mc:Choice>
+          <mc:Fallback>
+            <p:sp>
+              <p:nvSpPr>
+                <p:cNvPr id="89" name="Rectangle 88"/>
+                <p:cNvSpPr>
+                  <a:spLocks noRot="1" noChangeAspect="1" noMove="1" noResize="1" noEditPoints="1" noAdjustHandles="1" noChangeArrowheads="1" noChangeShapeType="1" noTextEdit="1"/>
+                </p:cNvSpPr>
+                <p:nvPr/>
+              </p:nvSpPr>
+              <p:spPr>
+                <a:xfrm>
+                  <a:off x="12340852" y="6409664"/>
+                  <a:ext cx="3656425" cy="491738"/>
+                </a:xfrm>
+                <a:prstGeom prst="rect">
+                  <a:avLst/>
+                </a:prstGeom>
+                <a:blipFill>
+                  <a:blip r:embed="rId6"/>
+                  <a:stretch>
+                    <a:fillRect l="-333" t="-8642" b="-22222"/>
+                  </a:stretch>
+                </a:blipFill>
+              </p:spPr>
+              <p:txBody>
+                <a:bodyPr/>
+                <a:lstStyle/>
+                <a:p>
+                  <a:r>
+                    <a:rPr lang="fr-FR">
+                      <a:noFill/>
+                    </a:rPr>
+                    <a:t> </a:t>
+                  </a:r>
+                </a:p>
+              </p:txBody>
+            </p:sp>
+          </mc:Fallback>
+        </mc:AlternateContent>
+        <p:sp>
+          <p:nvSpPr>
+            <p:cNvPr id="92" name="Rectangle 91"/>
+            <p:cNvSpPr/>
+            <p:nvPr/>
+          </p:nvSpPr>
+          <p:spPr>
+            <a:xfrm>
+              <a:off x="12726565" y="3086905"/>
+              <a:ext cx="1976104" cy="1255744"/>
+            </a:xfrm>
+            <a:prstGeom prst="rect">
+              <a:avLst/>
+            </a:prstGeom>
+            <a:solidFill>
+              <a:schemeClr val="accent2"/>
+            </a:solidFill>
+            <a:ln>
+              <a:noFill/>
+            </a:ln>
+          </p:spPr>
+          <p:style>
+            <a:lnRef idx="2">
+              <a:schemeClr val="accent1">
+                <a:shade val="50000"/>
+              </a:schemeClr>
+            </a:lnRef>
+            <a:fillRef idx="1">
+              <a:schemeClr val="accent1"/>
+            </a:fillRef>
+            <a:effectRef idx="0">
+              <a:schemeClr val="accent1"/>
+            </a:effectRef>
+            <a:fontRef idx="minor">
+              <a:schemeClr val="lt1"/>
+            </a:fontRef>
+          </p:style>
+          <p:txBody>
+            <a:bodyPr rot="0" spcFirstLastPara="0" vertOverflow="overflow" horzOverflow="overflow" vert="horz" wrap="square" lIns="91440" tIns="45720" rIns="91440" bIns="45720" numCol="1" spcCol="0" rtlCol="0" fromWordArt="0" anchor="ctr" anchorCtr="0" forceAA="0" compatLnSpc="1">
+              <a:prstTxWarp prst="textNoShape">
+                <a:avLst/>
+              </a:prstTxWarp>
+              <a:noAutofit/>
+            </a:bodyPr>
+            <a:lstStyle/>
+            <a:p>
+              <a:pPr algn="ctr"/>
+              <a:r>
+                <a:rPr lang="fr-FR" sz="1600" dirty="0"/>
+                <a:t>Population sélectionnée sur grain</a:t>
+              </a:r>
+            </a:p>
+          </p:txBody>
+        </p:sp>
+        <p:sp>
+          <p:nvSpPr>
+            <p:cNvPr id="93" name="Rectangle 92"/>
+            <p:cNvSpPr/>
+            <p:nvPr/>
+          </p:nvSpPr>
+          <p:spPr>
+            <a:xfrm>
+              <a:off x="8629538" y="4375833"/>
+              <a:ext cx="1968970" cy="2367012"/>
+            </a:xfrm>
+            <a:prstGeom prst="rect">
+              <a:avLst/>
+            </a:prstGeom>
+            <a:solidFill>
+              <a:schemeClr val="accent1">
+                <a:lumMod val="50000"/>
+              </a:schemeClr>
+            </a:solidFill>
+            <a:ln>
+              <a:noFill/>
+            </a:ln>
+          </p:spPr>
+          <p:style>
+            <a:lnRef idx="2">
+              <a:schemeClr val="accent1">
+                <a:shade val="50000"/>
+              </a:schemeClr>
+            </a:lnRef>
+            <a:fillRef idx="1">
+              <a:schemeClr val="accent1"/>
+            </a:fillRef>
+            <a:effectRef idx="0">
+              <a:schemeClr val="accent1"/>
+            </a:effectRef>
+            <a:fontRef idx="minor">
+              <a:schemeClr val="lt1"/>
+            </a:fontRef>
+          </p:style>
+          <p:txBody>
+            <a:bodyPr rot="0" spcFirstLastPara="0" vertOverflow="overflow" horzOverflow="overflow" vert="horz" wrap="square" lIns="91440" tIns="45720" rIns="91440" bIns="45720" numCol="1" spcCol="0" rtlCol="0" fromWordArt="0" anchor="ctr" anchorCtr="0" forceAA="0" compatLnSpc="1">
+              <a:prstTxWarp prst="textNoShape">
+                <a:avLst/>
+              </a:prstTxWarp>
+              <a:noAutofit/>
+            </a:bodyPr>
+            <a:lstStyle/>
+            <a:p>
+              <a:pPr algn="ctr"/>
+              <a:r>
+                <a:rPr lang="fr-FR" dirty="0" smtClean="0"/>
+                <a:t>Données Optomachine </a:t>
+              </a:r>
+              <a:r>
+                <a:rPr lang="fr-FR" dirty="0"/>
+                <a:t>des </a:t>
+              </a:r>
+              <a:r>
+                <a:rPr lang="fr-FR" dirty="0" smtClean="0"/>
+                <a:t>bacs (mesures sur grains individuels)</a:t>
+              </a:r>
+              <a:endParaRPr lang="fr-FR" dirty="0"/>
+            </a:p>
+          </p:txBody>
+        </p:sp>
+        <p:sp>
+          <p:nvSpPr>
+            <p:cNvPr id="95" name="Rectangle 94"/>
+            <p:cNvSpPr/>
+            <p:nvPr/>
+          </p:nvSpPr>
+          <p:spPr>
+            <a:xfrm>
+              <a:off x="8636244" y="6750851"/>
+              <a:ext cx="1976104" cy="1255744"/>
+            </a:xfrm>
+            <a:prstGeom prst="rect">
+              <a:avLst/>
+            </a:prstGeom>
+            <a:solidFill>
+              <a:schemeClr val="accent2"/>
+            </a:solidFill>
+            <a:ln>
+              <a:noFill/>
+            </a:ln>
+          </p:spPr>
+          <p:style>
+            <a:lnRef idx="2">
+              <a:schemeClr val="accent1">
+                <a:shade val="50000"/>
+              </a:schemeClr>
+            </a:lnRef>
+            <a:fillRef idx="1">
+              <a:schemeClr val="accent1"/>
+            </a:fillRef>
+            <a:effectRef idx="0">
+              <a:schemeClr val="accent1"/>
+            </a:effectRef>
+            <a:fontRef idx="minor">
+              <a:schemeClr val="lt1"/>
+            </a:fontRef>
+          </p:style>
+          <p:txBody>
+            <a:bodyPr rot="0" spcFirstLastPara="0" vertOverflow="overflow" horzOverflow="overflow" vert="horz" wrap="square" lIns="91440" tIns="45720" rIns="91440" bIns="45720" numCol="1" spcCol="0" rtlCol="0" fromWordArt="0" anchor="ctr" anchorCtr="0" forceAA="0" compatLnSpc="1">
+              <a:prstTxWarp prst="textNoShape">
+                <a:avLst/>
+              </a:prstTxWarp>
+              <a:noAutofit/>
+            </a:bodyPr>
+            <a:lstStyle/>
+            <a:p>
+              <a:pPr algn="ctr"/>
+              <a:r>
+                <a:rPr lang="fr-FR" sz="1600" dirty="0"/>
+                <a:t>Population sélectionnée sur grain</a:t>
+              </a:r>
+            </a:p>
+          </p:txBody>
+        </p:sp>
+      </p:grpSp>
+    </p:spTree>
+    <p:extLst>
+      <p:ext uri="{BB962C8B-B14F-4D97-AF65-F5344CB8AC3E}">
+        <p14:creationId xmlns:p14="http://schemas.microsoft.com/office/powerpoint/2010/main" val="3796593031"/>
       </p:ext>
     </p:extLst>
   </p:cSld>

</xml_diff>